<commit_message>
course paper 2025: update presentation and text
</commit_message>
<xml_diff>
--- a/sem_6/course_paper/course_paper/Snezhko_course_paper.pptx
+++ b/sem_6/course_paper/course_paper/Snezhko_course_paper.pptx
@@ -7,16 +7,17 @@
   <p:sldIdLst>
     <p:sldId id="256" r:id="rId2"/>
     <p:sldId id="257" r:id="rId3"/>
-    <p:sldId id="258" r:id="rId4"/>
-    <p:sldId id="259" r:id="rId5"/>
-    <p:sldId id="260" r:id="rId6"/>
-    <p:sldId id="261" r:id="rId7"/>
-    <p:sldId id="262" r:id="rId8"/>
-    <p:sldId id="263" r:id="rId9"/>
-    <p:sldId id="264" r:id="rId10"/>
+    <p:sldId id="259" r:id="rId4"/>
+    <p:sldId id="260" r:id="rId5"/>
+    <p:sldId id="261" r:id="rId6"/>
+    <p:sldId id="262" r:id="rId7"/>
+    <p:sldId id="263" r:id="rId8"/>
+    <p:sldId id="264" r:id="rId9"/>
+    <p:sldId id="268" r:id="rId10"/>
     <p:sldId id="265" r:id="rId11"/>
     <p:sldId id="266" r:id="rId12"/>
-    <p:sldId id="267" r:id="rId13"/>
+    <p:sldId id="269" r:id="rId13"/>
+    <p:sldId id="267" r:id="rId14"/>
   </p:sldIdLst>
   <p:sldSz cx="12192000" cy="6858000"/>
   <p:notesSz cx="6858000" cy="9144000"/>
@@ -115,6 +116,11 @@
       </a:defRPr>
     </a:lvl9pPr>
   </p:defaultTextStyle>
+  <p:extLst>
+    <p:ext uri="{EFAFB233-063F-42B5-8137-9DF3F51BA10A}">
+      <p15:sldGuideLst xmlns:p15="http://schemas.microsoft.com/office/powerpoint/2012/main"/>
+    </p:ext>
+  </p:extLst>
 </p:presentation>
 </file>
 
@@ -3356,7 +3362,6 @@
             <a:r>
               <a:rPr lang="ru-RU" sz="1800" b="1" dirty="0">
                 <a:effectLst/>
-                <a:latin typeface="Times New Roman" panose="02020603050405020304" pitchFamily="18" charset="0"/>
                 <a:ea typeface="Calibri" panose="020F0502020204030204" pitchFamily="34" charset="0"/>
               </a:rPr>
               <a:t>ПРИМЕНЕНИЕ МЕТОДОВ МАШИННОГО ОБУЧЕНИЯ ДЛЯ ПРЕДСКАЗАНИЯ РАСТВОРИМОСТИ МАЛЫХ МОЛЕКУЛ</a:t>
@@ -3403,7 +3408,7 @@
             </a:pPr>
             <a:r>
               <a:rPr lang="ru-RU" sz="1000" dirty="0">
-                <a:latin typeface="Times New Roman" panose="02020603050405020304" pitchFamily="18" charset="0"/>
+                <a:latin typeface="+mj-lt"/>
                 <a:ea typeface="Calibri" panose="020F0502020204030204" pitchFamily="34" charset="0"/>
                 <a:cs typeface="Times New Roman" panose="02020603050405020304" pitchFamily="18" charset="0"/>
               </a:rPr>
@@ -3421,7 +3426,7 @@
             </a:pPr>
             <a:r>
               <a:rPr lang="ru-RU" sz="1000" dirty="0">
-                <a:latin typeface="Times New Roman" panose="02020603050405020304" pitchFamily="18" charset="0"/>
+                <a:latin typeface="+mj-lt"/>
                 <a:ea typeface="Calibri" panose="020F0502020204030204" pitchFamily="34" charset="0"/>
                 <a:cs typeface="Times New Roman" panose="02020603050405020304" pitchFamily="18" charset="0"/>
               </a:rPr>
@@ -3440,7 +3445,7 @@
             <a:r>
               <a:rPr lang="ru-RU" sz="1000" dirty="0">
                 <a:effectLst/>
-                <a:latin typeface="Times New Roman" panose="02020603050405020304" pitchFamily="18" charset="0"/>
+                <a:latin typeface="+mj-lt"/>
                 <a:ea typeface="Calibri" panose="020F0502020204030204" pitchFamily="34" charset="0"/>
                 <a:cs typeface="Times New Roman" panose="02020603050405020304" pitchFamily="18" charset="0"/>
               </a:rPr>
@@ -3455,7 +3460,7 @@
             </a:pPr>
             <a:r>
               <a:rPr lang="ru-RU" sz="1000" dirty="0">
-                <a:latin typeface="Times New Roman" panose="02020603050405020304" pitchFamily="18" charset="0"/>
+                <a:latin typeface="+mj-lt"/>
                 <a:ea typeface="Calibri" panose="020F0502020204030204" pitchFamily="34" charset="0"/>
               </a:rPr>
               <a:t>ст. преподаватель </a:t>
@@ -3463,12 +3468,14 @@
             <a:r>
               <a:rPr lang="ru-RU" sz="1000" dirty="0">
                 <a:effectLst/>
-                <a:latin typeface="Times New Roman" panose="02020603050405020304" pitchFamily="18" charset="0"/>
+                <a:latin typeface="+mj-lt"/>
                 <a:ea typeface="Calibri" panose="020F0502020204030204" pitchFamily="34" charset="0"/>
               </a:rPr>
               <a:t>Карпенко А.Д.</a:t>
             </a:r>
-            <a:endParaRPr lang="ru-RU" sz="1000" dirty="0"/>
+            <a:endParaRPr lang="ru-RU" sz="1000" dirty="0">
+              <a:latin typeface="+mj-lt"/>
+            </a:endParaRPr>
           </a:p>
         </p:txBody>
       </p:sp>
@@ -4018,7 +4025,7 @@
           <a:p>
             <a:r>
               <a:rPr lang="ru-RU" dirty="0"/>
-              <a:t>Результаты</a:t>
+              <a:t>Итоги</a:t>
             </a:r>
           </a:p>
         </p:txBody>
@@ -4328,15 +4335,15 @@
           <p:cNvPr id="2" name="Заголовок 1">
             <a:extLst>
               <a:ext uri="{FF2B5EF4-FFF2-40B4-BE49-F238E27FC236}">
-                <a16:creationId xmlns:a16="http://schemas.microsoft.com/office/drawing/2014/main" id="{1EF19D9A-CD63-4E82-8225-C7400CC8E78B}"/>
-              </a:ext>
-            </a:extLst>
-          </p:cNvPr>
-          <p:cNvSpPr>
-            <a:spLocks noGrp="1"/>
-          </p:cNvSpPr>
-          <p:nvPr>
-            <p:ph type="ctrTitle"/>
+                <a16:creationId xmlns:a16="http://schemas.microsoft.com/office/drawing/2014/main" id="{6F59BB6B-194E-4C2F-95E2-214054196EB1}"/>
+              </a:ext>
+            </a:extLst>
+          </p:cNvPr>
+          <p:cNvSpPr>
+            <a:spLocks noGrp="1"/>
+          </p:cNvSpPr>
+          <p:nvPr>
+            <p:ph type="title"/>
           </p:nvPr>
         </p:nvSpPr>
         <p:spPr/>
@@ -4345,9 +4352,139 @@
           <a:lstStyle/>
           <a:p>
             <a:r>
+              <a:rPr lang="ru-RU" dirty="0"/>
+              <a:t>Результаты</a:t>
+            </a:r>
+          </a:p>
+        </p:txBody>
+      </p:sp>
+      <p:sp>
+        <p:nvSpPr>
+          <p:cNvPr id="3" name="Объект 2">
+            <a:extLst>
+              <a:ext uri="{FF2B5EF4-FFF2-40B4-BE49-F238E27FC236}">
+                <a16:creationId xmlns:a16="http://schemas.microsoft.com/office/drawing/2014/main" id="{20288AC1-713D-425A-BC0E-428528E0D414}"/>
+              </a:ext>
+            </a:extLst>
+          </p:cNvPr>
+          <p:cNvSpPr>
+            <a:spLocks noGrp="1"/>
+          </p:cNvSpPr>
+          <p:nvPr>
+            <p:ph idx="1"/>
+          </p:nvPr>
+        </p:nvSpPr>
+        <p:spPr>
+          <a:xfrm>
+            <a:off x="5068294" y="5194189"/>
+            <a:ext cx="1093967" cy="416643"/>
+          </a:xfrm>
+        </p:spPr>
+        <p:txBody>
+          <a:bodyPr>
+            <a:normAutofit fontScale="92500" lnSpcReduction="10000"/>
+          </a:bodyPr>
+          <a:lstStyle/>
+          <a:p>
+            <a:pPr marL="0" indent="0">
+              <a:buNone/>
+            </a:pPr>
+            <a:r>
+              <a:rPr lang="en-US" dirty="0" err="1">
+                <a:latin typeface="+mj-lt"/>
+              </a:rPr>
+              <a:t>Github</a:t>
+            </a:r>
+            <a:endParaRPr lang="ru-RU" dirty="0">
+              <a:latin typeface="+mj-lt"/>
+            </a:endParaRPr>
+          </a:p>
+        </p:txBody>
+      </p:sp>
+      <p:pic>
+        <p:nvPicPr>
+          <p:cNvPr id="5" name="Рисунок 4">
+            <a:extLst>
+              <a:ext uri="{FF2B5EF4-FFF2-40B4-BE49-F238E27FC236}">
+                <a16:creationId xmlns:a16="http://schemas.microsoft.com/office/drawing/2014/main" id="{2E4047C9-7B73-4860-B734-755B397F291B}"/>
+              </a:ext>
+            </a:extLst>
+          </p:cNvPr>
+          <p:cNvPicPr>
+            <a:picLocks noChangeAspect="1"/>
+          </p:cNvPicPr>
+          <p:nvPr/>
+        </p:nvPicPr>
+        <p:blipFill>
+          <a:blip r:embed="rId2"/>
+          <a:stretch>
+            <a:fillRect/>
+          </a:stretch>
+        </p:blipFill>
+        <p:spPr>
+          <a:xfrm>
+            <a:off x="3850087" y="1677249"/>
+            <a:ext cx="3530379" cy="3530379"/>
+          </a:xfrm>
+          <a:prstGeom prst="rect">
+            <a:avLst/>
+          </a:prstGeom>
+        </p:spPr>
+      </p:pic>
+    </p:spTree>
+    <p:extLst>
+      <p:ext uri="{BB962C8B-B14F-4D97-AF65-F5344CB8AC3E}">
+        <p14:creationId xmlns:p14="http://schemas.microsoft.com/office/powerpoint/2010/main" val="1615808667"/>
+      </p:ext>
+    </p:extLst>
+  </p:cSld>
+  <p:clrMapOvr>
+    <a:masterClrMapping/>
+  </p:clrMapOvr>
+</p:sld>
+</file>
+
+<file path=ppt/slides/slide13.xml><?xml version="1.0" encoding="utf-8"?>
+<p:sld xmlns:a="http://schemas.openxmlformats.org/drawingml/2006/main" xmlns:r="http://schemas.openxmlformats.org/officeDocument/2006/relationships" xmlns:p="http://schemas.openxmlformats.org/presentationml/2006/main">
+  <p:cSld>
+    <p:spTree>
+      <p:nvGrpSpPr>
+        <p:cNvPr id="1" name=""/>
+        <p:cNvGrpSpPr/>
+        <p:nvPr/>
+      </p:nvGrpSpPr>
+      <p:grpSpPr>
+        <a:xfrm>
+          <a:off x="0" y="0"/>
+          <a:ext cx="0" cy="0"/>
+          <a:chOff x="0" y="0"/>
+          <a:chExt cx="0" cy="0"/>
+        </a:xfrm>
+      </p:grpSpPr>
+      <p:sp>
+        <p:nvSpPr>
+          <p:cNvPr id="2" name="Заголовок 1">
+            <a:extLst>
+              <a:ext uri="{FF2B5EF4-FFF2-40B4-BE49-F238E27FC236}">
+                <a16:creationId xmlns:a16="http://schemas.microsoft.com/office/drawing/2014/main" id="{1EF19D9A-CD63-4E82-8225-C7400CC8E78B}"/>
+              </a:ext>
+            </a:extLst>
+          </p:cNvPr>
+          <p:cNvSpPr>
+            <a:spLocks noGrp="1"/>
+          </p:cNvSpPr>
+          <p:nvPr>
+            <p:ph type="ctrTitle"/>
+          </p:nvPr>
+        </p:nvSpPr>
+        <p:spPr/>
+        <p:txBody>
+          <a:bodyPr/>
+          <a:lstStyle/>
+          <a:p>
+            <a:r>
               <a:rPr lang="ru-RU" sz="1800" b="1" dirty="0">
                 <a:effectLst/>
-                <a:latin typeface="Times New Roman" panose="02020603050405020304" pitchFamily="18" charset="0"/>
                 <a:ea typeface="Calibri" panose="020F0502020204030204" pitchFamily="34" charset="0"/>
               </a:rPr>
               <a:t>ПРИМЕНЕНИЕ МЕТОДОВ МАШИННОГО ОБУЧЕНИЯ ДЛЯ ПРЕДСКАЗАНИЯ РАСТВОРИМОСТИ МАЛЫХ МОЛЕКУЛ</a:t>
@@ -4394,7 +4531,7 @@
             </a:pPr>
             <a:r>
               <a:rPr lang="ru-RU" sz="1000" dirty="0">
-                <a:latin typeface="Times New Roman" panose="02020603050405020304" pitchFamily="18" charset="0"/>
+                <a:latin typeface="+mj-lt"/>
                 <a:ea typeface="Calibri" panose="020F0502020204030204" pitchFamily="34" charset="0"/>
                 <a:cs typeface="Times New Roman" panose="02020603050405020304" pitchFamily="18" charset="0"/>
               </a:rPr>
@@ -4412,7 +4549,7 @@
             </a:pPr>
             <a:r>
               <a:rPr lang="ru-RU" sz="1000" dirty="0">
-                <a:latin typeface="Times New Roman" panose="02020603050405020304" pitchFamily="18" charset="0"/>
+                <a:latin typeface="+mj-lt"/>
                 <a:ea typeface="Calibri" panose="020F0502020204030204" pitchFamily="34" charset="0"/>
                 <a:cs typeface="Times New Roman" panose="02020603050405020304" pitchFamily="18" charset="0"/>
               </a:rPr>
@@ -4431,7 +4568,7 @@
             <a:r>
               <a:rPr lang="ru-RU" sz="1000" dirty="0">
                 <a:effectLst/>
-                <a:latin typeface="Times New Roman" panose="02020603050405020304" pitchFamily="18" charset="0"/>
+                <a:latin typeface="+mj-lt"/>
                 <a:ea typeface="Calibri" panose="020F0502020204030204" pitchFamily="34" charset="0"/>
                 <a:cs typeface="Times New Roman" panose="02020603050405020304" pitchFamily="18" charset="0"/>
               </a:rPr>
@@ -4446,7 +4583,7 @@
             </a:pPr>
             <a:r>
               <a:rPr lang="ru-RU" sz="1000" dirty="0">
-                <a:latin typeface="Times New Roman" panose="02020603050405020304" pitchFamily="18" charset="0"/>
+                <a:latin typeface="+mj-lt"/>
                 <a:ea typeface="Calibri" panose="020F0502020204030204" pitchFamily="34" charset="0"/>
               </a:rPr>
               <a:t>ст. преподаватель </a:t>
@@ -4454,12 +4591,14 @@
             <a:r>
               <a:rPr lang="ru-RU" sz="1000" dirty="0">
                 <a:effectLst/>
-                <a:latin typeface="Times New Roman" panose="02020603050405020304" pitchFamily="18" charset="0"/>
+                <a:latin typeface="+mj-lt"/>
                 <a:ea typeface="Calibri" panose="020F0502020204030204" pitchFamily="34" charset="0"/>
               </a:rPr>
               <a:t>Карпенко А.Д.</a:t>
             </a:r>
-            <a:endParaRPr lang="ru-RU" sz="1000" dirty="0"/>
+            <a:endParaRPr lang="ru-RU" sz="1000" dirty="0">
+              <a:latin typeface="+mj-lt"/>
+            </a:endParaRPr>
           </a:p>
         </p:txBody>
       </p:sp>
@@ -4548,11 +4687,15 @@
               <a:buNone/>
             </a:pPr>
             <a:r>
-              <a:rPr lang="ru-RU" sz="2000" b="1" dirty="0"/>
+              <a:rPr lang="ru-RU" sz="2000" b="1" dirty="0">
+                <a:latin typeface="+mj-lt"/>
+              </a:rPr>
               <a:t>Цель работы</a:t>
             </a:r>
             <a:r>
-              <a:rPr lang="ru-RU" sz="2000" dirty="0"/>
+              <a:rPr lang="ru-RU" sz="2000" dirty="0">
+                <a:latin typeface="+mj-lt"/>
+              </a:rPr>
               <a:t> – провести сравнительный анализ эффективности различных методов МО в решении задачи предсказания свойств малых молекул и объяснить полученные результаты.</a:t>
             </a:r>
           </a:p>
@@ -4560,14 +4703,18 @@
             <a:pPr marL="0" indent="0">
               <a:buNone/>
             </a:pPr>
-            <a:endParaRPr lang="ru-RU" sz="2000" dirty="0"/>
+            <a:endParaRPr lang="ru-RU" sz="2000" dirty="0">
+              <a:latin typeface="+mj-lt"/>
+            </a:endParaRPr>
           </a:p>
           <a:p>
             <a:pPr marL="0" indent="0">
               <a:buNone/>
             </a:pPr>
             <a:r>
-              <a:rPr lang="ru-RU" sz="2000" b="1" dirty="0"/>
+              <a:rPr lang="ru-RU" sz="2000" b="1" dirty="0">
+                <a:latin typeface="+mj-lt"/>
+              </a:rPr>
               <a:t>Задачи:</a:t>
             </a:r>
           </a:p>
@@ -4576,7 +4723,9 @@
               <a:buNone/>
             </a:pPr>
             <a:r>
-              <a:rPr lang="ru-RU" sz="2000" dirty="0"/>
+              <a:rPr lang="ru-RU" sz="2000" dirty="0">
+                <a:latin typeface="+mj-lt"/>
+              </a:rPr>
               <a:t>- Обоснование актуальности задачи предсказания свойств малых молекул</a:t>
             </a:r>
           </a:p>
@@ -4585,7 +4734,9 @@
               <a:buNone/>
             </a:pPr>
             <a:r>
-              <a:rPr lang="ru-RU" sz="2000" dirty="0"/>
+              <a:rPr lang="ru-RU" sz="2000" dirty="0">
+                <a:latin typeface="+mj-lt"/>
+              </a:rPr>
               <a:t>- Поиск и выборка различных методов МО для сравнительного анализа</a:t>
             </a:r>
           </a:p>
@@ -4594,15 +4745,21 @@
               <a:buNone/>
             </a:pPr>
             <a:r>
-              <a:rPr lang="ru-RU" sz="2000" dirty="0"/>
+              <a:rPr lang="ru-RU" sz="2000" dirty="0">
+                <a:latin typeface="+mj-lt"/>
+              </a:rPr>
               <a:t>- Проверка эффективности моделей для предсказания свойств малых молекул (например, растворимости) на едином </a:t>
             </a:r>
             <a:r>
-              <a:rPr lang="ru-RU" sz="2000" dirty="0" err="1"/>
+              <a:rPr lang="ru-RU" sz="2000" dirty="0" err="1">
+                <a:latin typeface="+mj-lt"/>
+              </a:rPr>
               <a:t>датасете</a:t>
             </a:r>
             <a:r>
-              <a:rPr lang="ru-RU" sz="2000" dirty="0"/>
+              <a:rPr lang="ru-RU" sz="2000" dirty="0">
+                <a:latin typeface="+mj-lt"/>
+              </a:rPr>
               <a:t>.</a:t>
             </a:r>
           </a:p>
@@ -4611,7 +4768,9 @@
               <a:buNone/>
             </a:pPr>
             <a:r>
-              <a:rPr lang="ru-RU" sz="2000" dirty="0"/>
+              <a:rPr lang="ru-RU" sz="2000" dirty="0">
+                <a:latin typeface="+mj-lt"/>
+              </a:rPr>
               <a:t>- Сравнительный анализ результатов различных моделей.</a:t>
             </a:r>
           </a:p>
@@ -4620,7 +4779,9 @@
               <a:buNone/>
             </a:pPr>
             <a:r>
-              <a:rPr lang="ru-RU" sz="2000" dirty="0"/>
+              <a:rPr lang="ru-RU" sz="2000" dirty="0">
+                <a:latin typeface="+mj-lt"/>
+              </a:rPr>
               <a:t>- Трактовка результатов и подведение итогов.</a:t>
             </a:r>
           </a:p>
@@ -4628,7 +4789,9 @@
             <a:pPr marL="0" indent="0">
               <a:buNone/>
             </a:pPr>
-            <a:endParaRPr lang="ru-RU" sz="2000" dirty="0"/>
+            <a:endParaRPr lang="ru-RU" sz="2000" dirty="0">
+              <a:latin typeface="+mj-lt"/>
+            </a:endParaRPr>
           </a:p>
         </p:txBody>
       </p:sp>
@@ -4667,7 +4830,7 @@
           <p:cNvPr id="2" name="Заголовок 1">
             <a:extLst>
               <a:ext uri="{FF2B5EF4-FFF2-40B4-BE49-F238E27FC236}">
-                <a16:creationId xmlns:a16="http://schemas.microsoft.com/office/drawing/2014/main" id="{F9123023-FC2B-4AF3-A67C-E3B6DDB7F637}"/>
+                <a16:creationId xmlns:a16="http://schemas.microsoft.com/office/drawing/2014/main" id="{B7697A76-7F49-4F0E-88A6-5D4417C51A21}"/>
               </a:ext>
             </a:extLst>
           </p:cNvPr>
@@ -4685,7 +4848,7 @@
           <a:p>
             <a:r>
               <a:rPr lang="ru-RU" dirty="0"/>
-              <a:t>Малая молекула</a:t>
+              <a:t>Важнейшие свойства малой молекулы</a:t>
             </a:r>
           </a:p>
         </p:txBody>
@@ -4695,7 +4858,7 @@
           <p:cNvPr id="3" name="Объект 2">
             <a:extLst>
               <a:ext uri="{FF2B5EF4-FFF2-40B4-BE49-F238E27FC236}">
-                <a16:creationId xmlns:a16="http://schemas.microsoft.com/office/drawing/2014/main" id="{C28C6D0C-5685-4462-85BE-F00790A5CB6B}"/>
+                <a16:creationId xmlns:a16="http://schemas.microsoft.com/office/drawing/2014/main" id="{B74D4CA4-C66A-4094-A744-9EE0C09CC8CA}"/>
               </a:ext>
             </a:extLst>
           </p:cNvPr>
@@ -4713,32 +4876,240 @@
           </a:bodyPr>
           <a:lstStyle/>
           <a:p>
-            <a:pPr marL="0" indent="0">
-              <a:buNone/>
+            <a:pPr>
+              <a:lnSpc>
+                <a:spcPts val="1800"/>
+              </a:lnSpc>
+              <a:spcAft>
+                <a:spcPts val="800"/>
+              </a:spcAft>
             </a:pPr>
             <a:r>
-              <a:rPr lang="ru-RU" sz="2000" b="1" dirty="0"/>
-              <a:t>Малая молекула</a:t>
-            </a:r>
-            <a:r>
-              <a:rPr lang="ru-RU" sz="2000" dirty="0"/>
-              <a:t> – химическое соединение со сравнительно малой молекулярной массой (не более 900-1000 дальтон), обладающее той или иной биологической активностью и размером порядка 1 </a:t>
-            </a:r>
-            <a:r>
-              <a:rPr lang="ru-RU" sz="2000" dirty="0" err="1"/>
-              <a:t>нм</a:t>
-            </a:r>
-            <a:r>
-              <a:rPr lang="ru-RU" sz="2000" dirty="0"/>
-              <a:t>. Малые молекулы могут служить передатчиками сигнала, лекарствами, удобрениями, пестицидами и проч.</a:t>
-            </a:r>
+              <a:rPr lang="en-US" sz="1800" i="1" dirty="0">
+                <a:effectLst/>
+                <a:latin typeface="+mj-lt"/>
+                <a:ea typeface="Times New Roman" panose="02020603050405020304" pitchFamily="18" charset="0"/>
+              </a:rPr>
+              <a:t>Molecular </a:t>
+            </a:r>
+            <a:r>
+              <a:rPr lang="en-US" sz="1800" i="1" dirty="0">
+                <a:latin typeface="+mj-lt"/>
+                <a:ea typeface="Times New Roman" panose="02020603050405020304" pitchFamily="18" charset="0"/>
+              </a:rPr>
+              <a:t>w</a:t>
+            </a:r>
+            <a:r>
+              <a:rPr lang="en-US" sz="1800" i="1" dirty="0">
+                <a:effectLst/>
+                <a:latin typeface="+mj-lt"/>
+                <a:ea typeface="Times New Roman" panose="02020603050405020304" pitchFamily="18" charset="0"/>
+              </a:rPr>
+              <a:t>eight</a:t>
+            </a:r>
+            <a:r>
+              <a:rPr lang="ru-RU" sz="1800" i="1" dirty="0">
+                <a:effectLst/>
+                <a:latin typeface="+mj-lt"/>
+                <a:ea typeface="Times New Roman" panose="02020603050405020304" pitchFamily="18" charset="0"/>
+              </a:rPr>
+              <a:t>, </a:t>
+            </a:r>
+            <a:r>
+              <a:rPr lang="en-US" sz="1800" i="1" dirty="0">
+                <a:effectLst/>
+                <a:latin typeface="+mj-lt"/>
+                <a:ea typeface="Times New Roman" panose="02020603050405020304" pitchFamily="18" charset="0"/>
+              </a:rPr>
+              <a:t>MW</a:t>
+            </a:r>
+            <a:endParaRPr lang="ru-RU" sz="1800" dirty="0">
+              <a:effectLst/>
+              <a:latin typeface="+mj-lt"/>
+              <a:ea typeface="Times New Roman" panose="02020603050405020304" pitchFamily="18" charset="0"/>
+            </a:endParaRPr>
+          </a:p>
+          <a:p>
+            <a:pPr>
+              <a:lnSpc>
+                <a:spcPts val="1800"/>
+              </a:lnSpc>
+              <a:spcAft>
+                <a:spcPts val="800"/>
+              </a:spcAft>
+            </a:pPr>
+            <a:r>
+              <a:rPr lang="en-US" sz="1800" b="1" i="1" dirty="0">
+                <a:latin typeface="+mj-lt"/>
+                <a:ea typeface="Times New Roman" panose="02020603050405020304" pitchFamily="18" charset="0"/>
+              </a:rPr>
+              <a:t>A</a:t>
+            </a:r>
+            <a:r>
+              <a:rPr lang="en-US" sz="1800" b="1" i="1" dirty="0">
+                <a:effectLst/>
+                <a:latin typeface="+mj-lt"/>
+                <a:ea typeface="Times New Roman" panose="02020603050405020304" pitchFamily="18" charset="0"/>
+              </a:rPr>
+              <a:t>qua</a:t>
+            </a:r>
+            <a:r>
+              <a:rPr lang="ru-RU" sz="1800" b="1" i="1" dirty="0">
+                <a:effectLst/>
+                <a:latin typeface="+mj-lt"/>
+                <a:ea typeface="Times New Roman" panose="02020603050405020304" pitchFamily="18" charset="0"/>
+              </a:rPr>
+              <a:t> </a:t>
+            </a:r>
+            <a:r>
+              <a:rPr lang="ru-RU" sz="1800" b="1" i="1" dirty="0" err="1">
+                <a:effectLst/>
+                <a:latin typeface="+mj-lt"/>
+                <a:ea typeface="Times New Roman" panose="02020603050405020304" pitchFamily="18" charset="0"/>
+              </a:rPr>
+              <a:t>solubility</a:t>
+            </a:r>
+            <a:endParaRPr lang="ru-RU" sz="1800" b="1" dirty="0">
+              <a:effectLst/>
+              <a:latin typeface="+mj-lt"/>
+              <a:ea typeface="Times New Roman" panose="02020603050405020304" pitchFamily="18" charset="0"/>
+            </a:endParaRPr>
+          </a:p>
+          <a:p>
+            <a:pPr>
+              <a:lnSpc>
+                <a:spcPts val="1800"/>
+              </a:lnSpc>
+              <a:spcAft>
+                <a:spcPts val="800"/>
+              </a:spcAft>
+            </a:pPr>
+            <a:r>
+              <a:rPr lang="en-US" sz="1800" i="1" dirty="0">
+                <a:effectLst/>
+                <a:latin typeface="+mj-lt"/>
+                <a:ea typeface="Times New Roman" panose="02020603050405020304" pitchFamily="18" charset="0"/>
+              </a:rPr>
+              <a:t>L</a:t>
+            </a:r>
+            <a:r>
+              <a:rPr lang="ru-RU" sz="1800" i="1" dirty="0" err="1">
+                <a:effectLst/>
+                <a:latin typeface="+mj-lt"/>
+                <a:ea typeface="Times New Roman" panose="02020603050405020304" pitchFamily="18" charset="0"/>
+              </a:rPr>
+              <a:t>ipophilicity</a:t>
+            </a:r>
+            <a:endParaRPr lang="en-US" sz="1800" i="1" dirty="0">
+              <a:effectLst/>
+              <a:latin typeface="+mj-lt"/>
+              <a:ea typeface="Times New Roman" panose="02020603050405020304" pitchFamily="18" charset="0"/>
+            </a:endParaRPr>
+          </a:p>
+          <a:p>
+            <a:pPr>
+              <a:lnSpc>
+                <a:spcPts val="1800"/>
+              </a:lnSpc>
+              <a:spcAft>
+                <a:spcPts val="800"/>
+              </a:spcAft>
+            </a:pPr>
+            <a:r>
+              <a:rPr lang="en-US" sz="1800" i="1" dirty="0">
+                <a:effectLst/>
+                <a:latin typeface="+mj-lt"/>
+                <a:ea typeface="Times New Roman" panose="02020603050405020304" pitchFamily="18" charset="0"/>
+              </a:rPr>
+              <a:t>P</a:t>
+            </a:r>
+            <a:r>
+              <a:rPr lang="ru-RU" sz="1800" i="1" dirty="0" err="1">
+                <a:effectLst/>
+                <a:latin typeface="+mj-lt"/>
+                <a:ea typeface="Times New Roman" panose="02020603050405020304" pitchFamily="18" charset="0"/>
+              </a:rPr>
+              <a:t>ermeability</a:t>
+            </a:r>
+            <a:endParaRPr lang="en-US" sz="1800" i="1" dirty="0">
+              <a:effectLst/>
+              <a:latin typeface="+mj-lt"/>
+              <a:ea typeface="Times New Roman" panose="02020603050405020304" pitchFamily="18" charset="0"/>
+            </a:endParaRPr>
+          </a:p>
+          <a:p>
+            <a:pPr>
+              <a:lnSpc>
+                <a:spcPts val="1800"/>
+              </a:lnSpc>
+              <a:spcAft>
+                <a:spcPts val="800"/>
+              </a:spcAft>
+            </a:pPr>
+            <a:r>
+              <a:rPr lang="en-US" sz="1800" i="1" dirty="0">
+                <a:effectLst/>
+                <a:latin typeface="+mj-lt"/>
+                <a:ea typeface="Times New Roman" panose="02020603050405020304" pitchFamily="18" charset="0"/>
+              </a:rPr>
+              <a:t>ADMET</a:t>
+            </a:r>
+            <a:endParaRPr lang="ru-RU" sz="1800" dirty="0">
+              <a:effectLst/>
+              <a:latin typeface="+mj-lt"/>
+              <a:ea typeface="Times New Roman" panose="02020603050405020304" pitchFamily="18" charset="0"/>
+            </a:endParaRPr>
+          </a:p>
+          <a:p>
+            <a:pPr>
+              <a:lnSpc>
+                <a:spcPts val="1800"/>
+              </a:lnSpc>
+              <a:spcAft>
+                <a:spcPts val="800"/>
+              </a:spcAft>
+            </a:pPr>
+            <a:r>
+              <a:rPr lang="ru-RU" sz="1800" i="1" dirty="0">
+                <a:effectLst/>
+                <a:latin typeface="+mj-lt"/>
+                <a:ea typeface="Times New Roman" panose="02020603050405020304" pitchFamily="18" charset="0"/>
+              </a:rPr>
+              <a:t>PSA</a:t>
+            </a:r>
+            <a:endParaRPr lang="ru-RU" sz="1800" dirty="0">
+              <a:effectLst/>
+              <a:latin typeface="+mj-lt"/>
+              <a:ea typeface="Times New Roman" panose="02020603050405020304" pitchFamily="18" charset="0"/>
+            </a:endParaRPr>
+          </a:p>
+          <a:p>
+            <a:r>
+              <a:rPr lang="en-US" sz="1800" i="1" dirty="0">
+                <a:effectLst/>
+                <a:latin typeface="+mj-lt"/>
+                <a:ea typeface="Calibri" panose="020F0502020204030204" pitchFamily="34" charset="0"/>
+              </a:rPr>
+              <a:t>S</a:t>
+            </a:r>
+            <a:r>
+              <a:rPr lang="ru-RU" sz="1800" i="1" dirty="0" err="1">
+                <a:effectLst/>
+                <a:latin typeface="+mj-lt"/>
+                <a:ea typeface="Calibri" panose="020F0502020204030204" pitchFamily="34" charset="0"/>
+              </a:rPr>
+              <a:t>electivity</a:t>
+            </a:r>
+            <a:endParaRPr lang="ru-RU" dirty="0">
+              <a:latin typeface="+mj-lt"/>
+            </a:endParaRPr>
           </a:p>
         </p:txBody>
       </p:sp>
     </p:spTree>
     <p:extLst>
       <p:ext uri="{BB962C8B-B14F-4D97-AF65-F5344CB8AC3E}">
-        <p14:creationId xmlns:p14="http://schemas.microsoft.com/office/powerpoint/2010/main" val="1402313904"/>
+        <p14:creationId xmlns:p14="http://schemas.microsoft.com/office/powerpoint/2010/main" val="3271867911"/>
       </p:ext>
     </p:extLst>
   </p:cSld>
@@ -4770,7 +5141,7 @@
           <p:cNvPr id="2" name="Заголовок 1">
             <a:extLst>
               <a:ext uri="{FF2B5EF4-FFF2-40B4-BE49-F238E27FC236}">
-                <a16:creationId xmlns:a16="http://schemas.microsoft.com/office/drawing/2014/main" id="{B7697A76-7F49-4F0E-88A6-5D4417C51A21}"/>
+                <a16:creationId xmlns:a16="http://schemas.microsoft.com/office/drawing/2014/main" id="{F57DA2D6-D14E-4952-9F6A-4B97FC957417}"/>
               </a:ext>
             </a:extLst>
           </p:cNvPr>
@@ -4788,7 +5159,7 @@
           <a:p>
             <a:r>
               <a:rPr lang="ru-RU" dirty="0"/>
-              <a:t>Важнейшие свойства малой молекулы</a:t>
+              <a:t>Составление выборки</a:t>
             </a:r>
           </a:p>
         </p:txBody>
@@ -4798,298 +5169,97 @@
           <p:cNvPr id="3" name="Объект 2">
             <a:extLst>
               <a:ext uri="{FF2B5EF4-FFF2-40B4-BE49-F238E27FC236}">
-                <a16:creationId xmlns:a16="http://schemas.microsoft.com/office/drawing/2014/main" id="{B74D4CA4-C66A-4094-A744-9EE0C09CC8CA}"/>
-              </a:ext>
-            </a:extLst>
-          </p:cNvPr>
-          <p:cNvSpPr>
-            <a:spLocks noGrp="1"/>
-          </p:cNvSpPr>
-          <p:nvPr>
-            <p:ph idx="1"/>
+                <a16:creationId xmlns:a16="http://schemas.microsoft.com/office/drawing/2014/main" id="{BB61A05F-6671-47A1-8F5C-42AA157574A8}"/>
+              </a:ext>
+            </a:extLst>
+          </p:cNvPr>
+          <p:cNvSpPr>
+            <a:spLocks noGrp="1"/>
+          </p:cNvSpPr>
+          <p:nvPr>
+            <p:ph sz="half" idx="1"/>
           </p:nvPr>
         </p:nvSpPr>
         <p:spPr/>
         <p:txBody>
-          <a:bodyPr>
-            <a:normAutofit/>
-          </a:bodyPr>
+          <a:bodyPr/>
           <a:lstStyle/>
           <a:p>
-            <a:pPr>
-              <a:lnSpc>
-                <a:spcPts val="1800"/>
-              </a:lnSpc>
-              <a:spcAft>
-                <a:spcPts val="800"/>
-              </a:spcAft>
+            <a:pPr marL="0" indent="0">
+              <a:buNone/>
             </a:pPr>
             <a:r>
-              <a:rPr lang="en-US" sz="1800" i="1" dirty="0">
-                <a:effectLst/>
-                <a:latin typeface="+mj-lt"/>
-                <a:ea typeface="Times New Roman" panose="02020603050405020304" pitchFamily="18" charset="0"/>
-              </a:rPr>
-              <a:t>Molecular </a:t>
-            </a:r>
-            <a:r>
-              <a:rPr lang="en-US" sz="1800" i="1" dirty="0">
-                <a:latin typeface="+mj-lt"/>
-                <a:ea typeface="Times New Roman" panose="02020603050405020304" pitchFamily="18" charset="0"/>
-              </a:rPr>
-              <a:t>w</a:t>
-            </a:r>
-            <a:r>
-              <a:rPr lang="en-US" sz="1800" i="1" dirty="0">
-                <a:effectLst/>
-                <a:latin typeface="+mj-lt"/>
-                <a:ea typeface="Times New Roman" panose="02020603050405020304" pitchFamily="18" charset="0"/>
-              </a:rPr>
-              <a:t>eight</a:t>
-            </a:r>
-            <a:r>
-              <a:rPr lang="ru-RU" sz="1800" i="1" dirty="0">
-                <a:effectLst/>
-                <a:latin typeface="+mj-lt"/>
-                <a:ea typeface="Times New Roman" panose="02020603050405020304" pitchFamily="18" charset="0"/>
-              </a:rPr>
-              <a:t>, </a:t>
-            </a:r>
-            <a:r>
-              <a:rPr lang="en-US" sz="1800" i="1" dirty="0">
-                <a:effectLst/>
-                <a:latin typeface="+mj-lt"/>
-                <a:ea typeface="Times New Roman" panose="02020603050405020304" pitchFamily="18" charset="0"/>
-              </a:rPr>
-              <a:t>MW</a:t>
-            </a:r>
-            <a:endParaRPr lang="ru-RU" sz="1800" dirty="0">
-              <a:effectLst/>
-              <a:latin typeface="+mj-lt"/>
-              <a:ea typeface="Times New Roman" panose="02020603050405020304" pitchFamily="18" charset="0"/>
-            </a:endParaRPr>
-          </a:p>
-          <a:p>
-            <a:pPr>
-              <a:lnSpc>
-                <a:spcPts val="1800"/>
-              </a:lnSpc>
-              <a:spcAft>
-                <a:spcPts val="800"/>
-              </a:spcAft>
+              <a:rPr lang="ru-RU" dirty="0">
+                <a:latin typeface="+mj-lt"/>
+              </a:rPr>
+              <a:t>Требования к моделям</a:t>
+            </a:r>
+          </a:p>
+          <a:p>
+            <a:pPr marL="0" indent="0">
+              <a:buNone/>
             </a:pPr>
-            <a:r>
-              <a:rPr lang="en-US" sz="1800" i="1" dirty="0">
-                <a:latin typeface="+mj-lt"/>
-                <a:ea typeface="Times New Roman" panose="02020603050405020304" pitchFamily="18" charset="0"/>
-              </a:rPr>
-              <a:t>A</a:t>
-            </a:r>
-            <a:r>
-              <a:rPr lang="en-US" sz="1800" i="1" dirty="0">
-                <a:effectLst/>
-                <a:latin typeface="+mj-lt"/>
-                <a:ea typeface="Times New Roman" panose="02020603050405020304" pitchFamily="18" charset="0"/>
-              </a:rPr>
-              <a:t>qua</a:t>
-            </a:r>
-            <a:r>
-              <a:rPr lang="ru-RU" sz="1800" i="1" dirty="0">
-                <a:effectLst/>
-                <a:latin typeface="+mj-lt"/>
-                <a:ea typeface="Times New Roman" panose="02020603050405020304" pitchFamily="18" charset="0"/>
-              </a:rPr>
-              <a:t> </a:t>
-            </a:r>
-            <a:r>
-              <a:rPr lang="ru-RU" sz="1800" i="1" dirty="0" err="1">
-                <a:effectLst/>
-                <a:latin typeface="+mj-lt"/>
-                <a:ea typeface="Times New Roman" panose="02020603050405020304" pitchFamily="18" charset="0"/>
-              </a:rPr>
-              <a:t>solubility</a:t>
-            </a:r>
-            <a:endParaRPr lang="ru-RU" sz="1800" dirty="0">
-              <a:effectLst/>
-              <a:latin typeface="+mj-lt"/>
-              <a:ea typeface="Times New Roman" panose="02020603050405020304" pitchFamily="18" charset="0"/>
-            </a:endParaRPr>
-          </a:p>
-          <a:p>
-            <a:pPr>
-              <a:lnSpc>
-                <a:spcPts val="1800"/>
-              </a:lnSpc>
-              <a:spcAft>
-                <a:spcPts val="800"/>
-              </a:spcAft>
-            </a:pPr>
-            <a:r>
-              <a:rPr lang="en-US" sz="1800" i="1" dirty="0">
-                <a:effectLst/>
-                <a:latin typeface="+mj-lt"/>
-                <a:ea typeface="Times New Roman" panose="02020603050405020304" pitchFamily="18" charset="0"/>
-              </a:rPr>
-              <a:t>L</a:t>
-            </a:r>
-            <a:r>
-              <a:rPr lang="ru-RU" sz="1800" i="1" dirty="0" err="1">
-                <a:effectLst/>
-                <a:latin typeface="+mj-lt"/>
-                <a:ea typeface="Times New Roman" panose="02020603050405020304" pitchFamily="18" charset="0"/>
-              </a:rPr>
-              <a:t>ipophilicity</a:t>
-            </a:r>
-            <a:endParaRPr lang="en-US" sz="1800" i="1" dirty="0">
-              <a:effectLst/>
-              <a:latin typeface="+mj-lt"/>
-              <a:ea typeface="Times New Roman" panose="02020603050405020304" pitchFamily="18" charset="0"/>
-            </a:endParaRPr>
-          </a:p>
-          <a:p>
-            <a:pPr>
-              <a:lnSpc>
-                <a:spcPts val="1800"/>
-              </a:lnSpc>
-              <a:spcAft>
-                <a:spcPts val="800"/>
-              </a:spcAft>
-            </a:pPr>
-            <a:r>
-              <a:rPr lang="en-US" sz="1800" i="1" dirty="0">
-                <a:effectLst/>
-                <a:latin typeface="+mj-lt"/>
-                <a:ea typeface="Times New Roman" panose="02020603050405020304" pitchFamily="18" charset="0"/>
-              </a:rPr>
-              <a:t>P</a:t>
-            </a:r>
-            <a:r>
-              <a:rPr lang="ru-RU" sz="1800" i="1" dirty="0" err="1">
-                <a:effectLst/>
-                <a:latin typeface="+mj-lt"/>
-                <a:ea typeface="Times New Roman" panose="02020603050405020304" pitchFamily="18" charset="0"/>
-              </a:rPr>
-              <a:t>ermeability</a:t>
-            </a:r>
-            <a:endParaRPr lang="en-US" sz="1800" i="1" dirty="0">
-              <a:effectLst/>
-              <a:latin typeface="+mj-lt"/>
-              <a:ea typeface="Times New Roman" panose="02020603050405020304" pitchFamily="18" charset="0"/>
-            </a:endParaRPr>
-          </a:p>
-          <a:p>
-            <a:pPr>
-              <a:lnSpc>
-                <a:spcPts val="1800"/>
-              </a:lnSpc>
-              <a:spcAft>
-                <a:spcPts val="800"/>
-              </a:spcAft>
-            </a:pPr>
-            <a:r>
-              <a:rPr lang="en-US" sz="1800" i="1" dirty="0">
-                <a:effectLst/>
-                <a:latin typeface="+mj-lt"/>
-                <a:ea typeface="Times New Roman" panose="02020603050405020304" pitchFamily="18" charset="0"/>
-              </a:rPr>
-              <a:t>ADMET</a:t>
-            </a:r>
-            <a:endParaRPr lang="ru-RU" sz="1800" dirty="0">
-              <a:effectLst/>
-              <a:latin typeface="+mj-lt"/>
-              <a:ea typeface="Times New Roman" panose="02020603050405020304" pitchFamily="18" charset="0"/>
-            </a:endParaRPr>
-          </a:p>
-          <a:p>
-            <a:pPr>
-              <a:lnSpc>
-                <a:spcPts val="1800"/>
-              </a:lnSpc>
-              <a:spcAft>
-                <a:spcPts val="800"/>
-              </a:spcAft>
-            </a:pPr>
-            <a:r>
-              <a:rPr lang="ru-RU" sz="1800" i="1" dirty="0">
-                <a:effectLst/>
-                <a:latin typeface="+mj-lt"/>
-                <a:ea typeface="Times New Roman" panose="02020603050405020304" pitchFamily="18" charset="0"/>
-              </a:rPr>
-              <a:t>PSA</a:t>
-            </a:r>
-            <a:endParaRPr lang="ru-RU" sz="1800" dirty="0">
-              <a:effectLst/>
-              <a:latin typeface="+mj-lt"/>
-              <a:ea typeface="Times New Roman" panose="02020603050405020304" pitchFamily="18" charset="0"/>
-            </a:endParaRPr>
-          </a:p>
-          <a:p>
-            <a:r>
-              <a:rPr lang="en-US" sz="1800" i="1" dirty="0">
-                <a:effectLst/>
-                <a:latin typeface="+mj-lt"/>
-                <a:ea typeface="Calibri" panose="020F0502020204030204" pitchFamily="34" charset="0"/>
-              </a:rPr>
-              <a:t>S</a:t>
-            </a:r>
-            <a:r>
-              <a:rPr lang="ru-RU" sz="1800" i="1" dirty="0" err="1">
-                <a:effectLst/>
-                <a:latin typeface="+mj-lt"/>
-                <a:ea typeface="Calibri" panose="020F0502020204030204" pitchFamily="34" charset="0"/>
-              </a:rPr>
-              <a:t>electivity</a:t>
-            </a:r>
             <a:endParaRPr lang="ru-RU" dirty="0">
               <a:latin typeface="+mj-lt"/>
             </a:endParaRPr>
           </a:p>
-        </p:txBody>
-      </p:sp>
-    </p:spTree>
-    <p:extLst>
-      <p:ext uri="{BB962C8B-B14F-4D97-AF65-F5344CB8AC3E}">
-        <p14:creationId xmlns:p14="http://schemas.microsoft.com/office/powerpoint/2010/main" val="3271867911"/>
-      </p:ext>
-    </p:extLst>
-  </p:cSld>
-  <p:clrMapOvr>
-    <a:masterClrMapping/>
-  </p:clrMapOvr>
-</p:sld>
-</file>
-
-<file path=ppt/slides/slide5.xml><?xml version="1.0" encoding="utf-8"?>
-<p:sld xmlns:a="http://schemas.openxmlformats.org/drawingml/2006/main" xmlns:r="http://schemas.openxmlformats.org/officeDocument/2006/relationships" xmlns:p="http://schemas.openxmlformats.org/presentationml/2006/main">
-  <p:cSld>
-    <p:spTree>
-      <p:nvGrpSpPr>
-        <p:cNvPr id="1" name=""/>
-        <p:cNvGrpSpPr/>
-        <p:nvPr/>
-      </p:nvGrpSpPr>
-      <p:grpSpPr>
-        <a:xfrm>
-          <a:off x="0" y="0"/>
-          <a:ext cx="0" cy="0"/>
-          <a:chOff x="0" y="0"/>
-          <a:chExt cx="0" cy="0"/>
-        </a:xfrm>
-      </p:grpSpPr>
-      <p:sp>
-        <p:nvSpPr>
-          <p:cNvPr id="2" name="Заголовок 1">
-            <a:extLst>
-              <a:ext uri="{FF2B5EF4-FFF2-40B4-BE49-F238E27FC236}">
-                <a16:creationId xmlns:a16="http://schemas.microsoft.com/office/drawing/2014/main" id="{F57DA2D6-D14E-4952-9F6A-4B97FC957417}"/>
-              </a:ext>
-            </a:extLst>
-          </p:cNvPr>
-          <p:cNvSpPr>
-            <a:spLocks noGrp="1"/>
-          </p:cNvSpPr>
-          <p:nvPr>
-            <p:ph type="title"/>
+          <a:p>
+            <a:pPr marL="0" indent="0">
+              <a:buNone/>
+            </a:pPr>
+            <a:r>
+              <a:rPr lang="ru-RU" dirty="0">
+                <a:latin typeface="+mj-lt"/>
+              </a:rPr>
+              <a:t>	- разнообразие</a:t>
+            </a:r>
+          </a:p>
+          <a:p>
+            <a:pPr marL="0" indent="0">
+              <a:buNone/>
+            </a:pPr>
+            <a:r>
+              <a:rPr lang="ru-RU" dirty="0">
+                <a:latin typeface="+mj-lt"/>
+              </a:rPr>
+              <a:t>	- актуальность</a:t>
+            </a:r>
+          </a:p>
+          <a:p>
+            <a:pPr marL="0" indent="0">
+              <a:buNone/>
+            </a:pPr>
+            <a:r>
+              <a:rPr lang="ru-RU" dirty="0">
+                <a:latin typeface="+mj-lt"/>
+              </a:rPr>
+              <a:t>	- открытость</a:t>
+            </a:r>
+          </a:p>
+          <a:p>
+            <a:pPr marL="0" indent="0">
+              <a:buNone/>
+            </a:pPr>
+            <a:endParaRPr lang="ru-RU" dirty="0">
+              <a:latin typeface="+mj-lt"/>
+            </a:endParaRPr>
+          </a:p>
+        </p:txBody>
+      </p:sp>
+      <p:sp>
+        <p:nvSpPr>
+          <p:cNvPr id="4" name="Объект 3">
+            <a:extLst>
+              <a:ext uri="{FF2B5EF4-FFF2-40B4-BE49-F238E27FC236}">
+                <a16:creationId xmlns:a16="http://schemas.microsoft.com/office/drawing/2014/main" id="{07773485-CC30-46A2-AC8E-F411CA363B2D}"/>
+              </a:ext>
+            </a:extLst>
+          </p:cNvPr>
+          <p:cNvSpPr>
+            <a:spLocks noGrp="1"/>
+          </p:cNvSpPr>
+          <p:nvPr>
+            <p:ph sz="half" idx="2"/>
           </p:nvPr>
         </p:nvSpPr>
         <p:spPr/>
@@ -5097,55 +5267,42 @@
           <a:bodyPr/>
           <a:lstStyle/>
           <a:p>
-            <a:r>
-              <a:rPr lang="ru-RU" dirty="0"/>
-              <a:t>Составление выборки</a:t>
-            </a:r>
-          </a:p>
-        </p:txBody>
-      </p:sp>
-      <p:sp>
-        <p:nvSpPr>
-          <p:cNvPr id="3" name="Объект 2">
-            <a:extLst>
-              <a:ext uri="{FF2B5EF4-FFF2-40B4-BE49-F238E27FC236}">
-                <a16:creationId xmlns:a16="http://schemas.microsoft.com/office/drawing/2014/main" id="{BB61A05F-6671-47A1-8F5C-42AA157574A8}"/>
-              </a:ext>
-            </a:extLst>
-          </p:cNvPr>
-          <p:cNvSpPr>
-            <a:spLocks noGrp="1"/>
-          </p:cNvSpPr>
-          <p:nvPr>
-            <p:ph sz="half" idx="1"/>
-          </p:nvPr>
-        </p:nvSpPr>
-        <p:spPr/>
-        <p:txBody>
-          <a:bodyPr/>
-          <a:lstStyle/>
-          <a:p>
             <a:pPr marL="0" indent="0">
               <a:buNone/>
             </a:pPr>
             <a:r>
-              <a:rPr lang="ru-RU" dirty="0"/>
-              <a:t>Требования к моделям</a:t>
-            </a:r>
+              <a:rPr lang="ru-RU" dirty="0">
+                <a:latin typeface="+mj-lt"/>
+              </a:rPr>
+              <a:t>Требования к </a:t>
+            </a:r>
+            <a:r>
+              <a:rPr lang="ru-RU" dirty="0" err="1">
+                <a:latin typeface="+mj-lt"/>
+              </a:rPr>
+              <a:t>датасету</a:t>
+            </a:r>
+            <a:endParaRPr lang="ru-RU" dirty="0">
+              <a:latin typeface="+mj-lt"/>
+            </a:endParaRPr>
           </a:p>
           <a:p>
             <a:pPr marL="0" indent="0">
               <a:buNone/>
             </a:pPr>
-            <a:endParaRPr lang="ru-RU" dirty="0"/>
+            <a:endParaRPr lang="ru-RU" dirty="0">
+              <a:latin typeface="+mj-lt"/>
+            </a:endParaRPr>
           </a:p>
           <a:p>
             <a:pPr marL="0" indent="0">
               <a:buNone/>
             </a:pPr>
             <a:r>
-              <a:rPr lang="ru-RU" dirty="0"/>
-              <a:t>	- разнообразие</a:t>
+              <a:rPr lang="ru-RU" dirty="0">
+                <a:latin typeface="+mj-lt"/>
+              </a:rPr>
+              <a:t>	- открытость</a:t>
             </a:r>
           </a:p>
           <a:p>
@@ -5153,8 +5310,10 @@
               <a:buNone/>
             </a:pPr>
             <a:r>
-              <a:rPr lang="ru-RU" dirty="0"/>
-              <a:t>	- актуальность</a:t>
+              <a:rPr lang="ru-RU" dirty="0">
+                <a:latin typeface="+mj-lt"/>
+              </a:rPr>
+              <a:t>	- универсальность</a:t>
             </a:r>
           </a:p>
           <a:p>
@@ -5162,90 +5321,19 @@
               <a:buNone/>
             </a:pPr>
             <a:r>
-              <a:rPr lang="ru-RU" dirty="0"/>
-              <a:t>	- открытость</a:t>
+              <a:rPr lang="ru-RU" dirty="0">
+                <a:latin typeface="+mj-lt"/>
+              </a:rPr>
+              <a:t>	- соответствие тематике</a:t>
             </a:r>
           </a:p>
           <a:p>
             <a:pPr marL="0" indent="0">
               <a:buNone/>
             </a:pPr>
-            <a:endParaRPr lang="ru-RU" dirty="0"/>
-          </a:p>
-        </p:txBody>
-      </p:sp>
-      <p:sp>
-        <p:nvSpPr>
-          <p:cNvPr id="4" name="Объект 3">
-            <a:extLst>
-              <a:ext uri="{FF2B5EF4-FFF2-40B4-BE49-F238E27FC236}">
-                <a16:creationId xmlns:a16="http://schemas.microsoft.com/office/drawing/2014/main" id="{07773485-CC30-46A2-AC8E-F411CA363B2D}"/>
-              </a:ext>
-            </a:extLst>
-          </p:cNvPr>
-          <p:cNvSpPr>
-            <a:spLocks noGrp="1"/>
-          </p:cNvSpPr>
-          <p:nvPr>
-            <p:ph sz="half" idx="2"/>
-          </p:nvPr>
-        </p:nvSpPr>
-        <p:spPr/>
-        <p:txBody>
-          <a:bodyPr/>
-          <a:lstStyle/>
-          <a:p>
-            <a:pPr marL="0" indent="0">
-              <a:buNone/>
-            </a:pPr>
-            <a:r>
-              <a:rPr lang="ru-RU" dirty="0"/>
-              <a:t>Требования к </a:t>
-            </a:r>
-            <a:r>
-              <a:rPr lang="ru-RU" dirty="0" err="1"/>
-              <a:t>датасету</a:t>
-            </a:r>
-            <a:endParaRPr lang="ru-RU" dirty="0"/>
-          </a:p>
-          <a:p>
-            <a:pPr marL="0" indent="0">
-              <a:buNone/>
-            </a:pPr>
-            <a:endParaRPr lang="ru-RU" dirty="0"/>
-          </a:p>
-          <a:p>
-            <a:pPr marL="0" indent="0">
-              <a:buNone/>
-            </a:pPr>
-            <a:r>
-              <a:rPr lang="ru-RU" dirty="0"/>
-              <a:t>	- открытость</a:t>
-            </a:r>
-          </a:p>
-          <a:p>
-            <a:pPr marL="0" indent="0">
-              <a:buNone/>
-            </a:pPr>
-            <a:r>
-              <a:rPr lang="ru-RU" dirty="0"/>
-              <a:t>	- универсальность</a:t>
-            </a:r>
-          </a:p>
-          <a:p>
-            <a:pPr marL="0" indent="0">
-              <a:buNone/>
-            </a:pPr>
-            <a:r>
-              <a:rPr lang="ru-RU" dirty="0"/>
-              <a:t>	- соответствие тематике</a:t>
-            </a:r>
-          </a:p>
-          <a:p>
-            <a:pPr marL="0" indent="0">
-              <a:buNone/>
-            </a:pPr>
-            <a:endParaRPr lang="ru-RU" dirty="0"/>
+            <a:endParaRPr lang="ru-RU" dirty="0">
+              <a:latin typeface="+mj-lt"/>
+            </a:endParaRPr>
           </a:p>
         </p:txBody>
       </p:sp>
@@ -5262,7 +5350,7 @@
 </p:sld>
 </file>
 
-<file path=ppt/slides/slide6.xml><?xml version="1.0" encoding="utf-8"?>
+<file path=ppt/slides/slide5.xml><?xml version="1.0" encoding="utf-8"?>
 <p:sld xmlns:a="http://schemas.openxmlformats.org/drawingml/2006/main" xmlns:r="http://schemas.openxmlformats.org/officeDocument/2006/relationships" xmlns:p="http://schemas.openxmlformats.org/presentationml/2006/main">
   <p:cSld>
     <p:spTree>
@@ -5696,6 +5784,99 @@
           </a:extLst>
         </p:spPr>
       </p:pic>
+      <p:sp>
+        <p:nvSpPr>
+          <p:cNvPr id="4" name="TextBox 3">
+            <a:extLst>
+              <a:ext uri="{FF2B5EF4-FFF2-40B4-BE49-F238E27FC236}">
+                <a16:creationId xmlns:a16="http://schemas.microsoft.com/office/drawing/2014/main" id="{1774B777-EB8E-4068-9A4F-890D91990EA1}"/>
+              </a:ext>
+            </a:extLst>
+          </p:cNvPr>
+          <p:cNvSpPr txBox="1"/>
+          <p:nvPr/>
+        </p:nvSpPr>
+        <p:spPr>
+          <a:xfrm>
+            <a:off x="485030" y="3991555"/>
+            <a:ext cx="5086649" cy="1477328"/>
+          </a:xfrm>
+          <a:prstGeom prst="rect">
+            <a:avLst/>
+          </a:prstGeom>
+          <a:noFill/>
+        </p:spPr>
+        <p:txBody>
+          <a:bodyPr wrap="none" rtlCol="0">
+            <a:spAutoFit/>
+          </a:bodyPr>
+          <a:lstStyle/>
+          <a:p>
+            <a:r>
+              <a:rPr lang="ru-RU" dirty="0">
+                <a:latin typeface="+mj-lt"/>
+              </a:rPr>
+              <a:t>- активно применяется в научных целях, </a:t>
+            </a:r>
+          </a:p>
+          <a:p>
+            <a:r>
+              <a:rPr lang="ru-RU" dirty="0">
+                <a:latin typeface="+mj-lt"/>
+              </a:rPr>
+              <a:t>- вносит требуемое разнообразие</a:t>
+            </a:r>
+          </a:p>
+          <a:p>
+            <a:r>
+              <a:rPr lang="ru-RU" dirty="0">
+                <a:latin typeface="+mj-lt"/>
+              </a:rPr>
+              <a:t>- находится в свободном доступе на </a:t>
+            </a:r>
+            <a:r>
+              <a:rPr lang="ru-RU" dirty="0" err="1">
+                <a:latin typeface="+mj-lt"/>
+              </a:rPr>
+              <a:t>Hugging</a:t>
+            </a:r>
+            <a:r>
+              <a:rPr lang="ru-RU" dirty="0">
+                <a:latin typeface="+mj-lt"/>
+              </a:rPr>
+              <a:t> Face.</a:t>
+            </a:r>
+          </a:p>
+          <a:p>
+            <a:r>
+              <a:rPr lang="ru-RU" dirty="0">
+                <a:latin typeface="+mj-lt"/>
+              </a:rPr>
+              <a:t>- применяется к молекулам в формате SMILES</a:t>
+            </a:r>
+          </a:p>
+          <a:p>
+            <a:r>
+              <a:rPr lang="ru-RU" dirty="0">
+                <a:latin typeface="+mj-lt"/>
+              </a:rPr>
+              <a:t>- может быть </a:t>
+            </a:r>
+            <a:r>
+              <a:rPr lang="ru-RU" dirty="0" err="1">
+                <a:latin typeface="+mj-lt"/>
+              </a:rPr>
+              <a:t>дообучена</a:t>
+            </a:r>
+            <a:r>
+              <a:rPr lang="ru-RU" dirty="0">
+                <a:latin typeface="+mj-lt"/>
+              </a:rPr>
+              <a:t> и применена на CPU</a:t>
+            </a:r>
+          </a:p>
+        </p:txBody>
+      </p:sp>
     </p:spTree>
     <p:extLst>
       <p:ext uri="{BB962C8B-B14F-4D97-AF65-F5344CB8AC3E}">
@@ -5709,7 +5890,7 @@
 </p:sld>
 </file>
 
-<file path=ppt/slides/slide7.xml><?xml version="1.0" encoding="utf-8"?>
+<file path=ppt/slides/slide6.xml><?xml version="1.0" encoding="utf-8"?>
 <p:sld xmlns:a="http://schemas.openxmlformats.org/drawingml/2006/main" xmlns:r="http://schemas.openxmlformats.org/officeDocument/2006/relationships" xmlns:p="http://schemas.openxmlformats.org/presentationml/2006/main">
   <p:cSld>
     <p:spTree>
@@ -5779,7 +5960,7 @@
             </p:nvSpPr>
             <p:spPr>
               <a:xfrm>
-                <a:off x="7394713" y="1825625"/>
+                <a:off x="7713055" y="1541372"/>
                 <a:ext cx="3959086" cy="4351338"/>
               </a:xfrm>
             </p:spPr>
@@ -6596,13 +6777,13 @@
             </p:nvSpPr>
             <p:spPr>
               <a:xfrm>
-                <a:off x="7394713" y="1825625"/>
+                <a:off x="7713055" y="1541372"/>
                 <a:ext cx="3959086" cy="4351338"/>
               </a:xfrm>
               <a:blipFill>
                 <a:blip r:embed="rId2"/>
                 <a:stretch>
-                  <a:fillRect l="-3082" t="-4762"/>
+                  <a:fillRect l="-3077" t="-4762"/>
                 </a:stretch>
               </a:blipFill>
             </p:spPr>
@@ -6668,6 +6849,85 @@
           </a:extLst>
         </p:spPr>
       </p:pic>
+      <p:sp>
+        <p:nvSpPr>
+          <p:cNvPr id="4" name="TextBox 3">
+            <a:extLst>
+              <a:ext uri="{FF2B5EF4-FFF2-40B4-BE49-F238E27FC236}">
+                <a16:creationId xmlns:a16="http://schemas.microsoft.com/office/drawing/2014/main" id="{7F6F197E-291F-4091-AE36-61CF1B578743}"/>
+              </a:ext>
+            </a:extLst>
+          </p:cNvPr>
+          <p:cNvSpPr txBox="1"/>
+          <p:nvPr/>
+        </p:nvSpPr>
+        <p:spPr>
+          <a:xfrm>
+            <a:off x="519859" y="5292546"/>
+            <a:ext cx="6687047" cy="1200329"/>
+          </a:xfrm>
+          <a:prstGeom prst="rect">
+            <a:avLst/>
+          </a:prstGeom>
+          <a:noFill/>
+        </p:spPr>
+        <p:txBody>
+          <a:bodyPr wrap="square" rtlCol="0">
+            <a:spAutoFit/>
+          </a:bodyPr>
+          <a:lstStyle/>
+          <a:p>
+            <a:r>
+              <a:rPr lang="ru-RU" sz="1800" dirty="0">
+                <a:effectLst/>
+                <a:latin typeface="+mj-lt"/>
+                <a:ea typeface="Calibri" panose="020F0502020204030204" pitchFamily="34" charset="0"/>
+              </a:rPr>
+              <a:t>- усиливает архитектурное разнообразие</a:t>
+            </a:r>
+          </a:p>
+          <a:p>
+            <a:r>
+              <a:rPr lang="ru-RU" sz="1800" dirty="0">
+                <a:effectLst/>
+                <a:latin typeface="+mj-lt"/>
+                <a:ea typeface="Calibri" panose="020F0502020204030204" pitchFamily="34" charset="0"/>
+              </a:rPr>
+              <a:t>- обеспечивает реалистичное сравнение с GNN-классом моделей </a:t>
+            </a:r>
+          </a:p>
+          <a:p>
+            <a:r>
+              <a:rPr lang="ru-RU" dirty="0">
+                <a:latin typeface="+mj-lt"/>
+                <a:ea typeface="Calibri" panose="020F0502020204030204" pitchFamily="34" charset="0"/>
+              </a:rPr>
+              <a:t>- </a:t>
+            </a:r>
+            <a:r>
+              <a:rPr lang="ru-RU" sz="1800" dirty="0">
+                <a:effectLst/>
+                <a:latin typeface="+mj-lt"/>
+                <a:ea typeface="Calibri" panose="020F0502020204030204" pitchFamily="34" charset="0"/>
+              </a:rPr>
+              <a:t>соответствует современным практикам </a:t>
+            </a:r>
+          </a:p>
+          <a:p>
+            <a:r>
+              <a:rPr lang="ru-RU" sz="1800" dirty="0">
+                <a:effectLst/>
+                <a:latin typeface="+mj-lt"/>
+                <a:ea typeface="Calibri" panose="020F0502020204030204" pitchFamily="34" charset="0"/>
+              </a:rPr>
+              <a:t>- не нарушает критерии доступности и воспроизводимости</a:t>
+            </a:r>
+            <a:endParaRPr lang="ru-RU" dirty="0">
+              <a:latin typeface="+mj-lt"/>
+            </a:endParaRPr>
+          </a:p>
+        </p:txBody>
+      </p:sp>
     </p:spTree>
     <p:extLst>
       <p:ext uri="{BB962C8B-B14F-4D97-AF65-F5344CB8AC3E}">
@@ -6681,7 +6941,7 @@
 </p:sld>
 </file>
 
-<file path=ppt/slides/slide8.xml><?xml version="1.0" encoding="utf-8"?>
+<file path=ppt/slides/slide7.xml><?xml version="1.0" encoding="utf-8"?>
 <p:sld xmlns:a="http://schemas.openxmlformats.org/drawingml/2006/main" xmlns:r="http://schemas.openxmlformats.org/officeDocument/2006/relationships" xmlns:p="http://schemas.openxmlformats.org/presentationml/2006/main">
   <p:cSld>
     <p:spTree>
@@ -6747,15 +7007,64 @@
             <p:ph idx="1"/>
           </p:nvPr>
         </p:nvSpPr>
-        <p:spPr/>
-        <p:txBody>
-          <a:bodyPr/>
+        <p:spPr>
+          <a:xfrm>
+            <a:off x="838200" y="1825625"/>
+            <a:ext cx="4608443" cy="4351338"/>
+          </a:xfrm>
+        </p:spPr>
+        <p:txBody>
+          <a:bodyPr>
+            <a:normAutofit/>
+          </a:bodyPr>
           <a:lstStyle/>
           <a:p>
-            <a:pPr marL="0" indent="0">
-              <a:buNone/>
+            <a:pPr>
+              <a:buFontTx/>
+              <a:buChar char="-"/>
             </a:pPr>
-            <a:endParaRPr lang="ru-RU" dirty="0"/>
+            <a:r>
+              <a:rPr lang="ru-RU" sz="1800" dirty="0">
+                <a:latin typeface="+mj-lt"/>
+              </a:rPr>
+              <a:t>не требует обучения на GPU или большого объема оперативной памяти </a:t>
+            </a:r>
+            <a:endParaRPr lang="en-US" sz="1800" dirty="0">
+              <a:latin typeface="+mj-lt"/>
+            </a:endParaRPr>
+          </a:p>
+          <a:p>
+            <a:pPr>
+              <a:buFontTx/>
+              <a:buChar char="-"/>
+            </a:pPr>
+            <a:r>
+              <a:rPr lang="ru-RU" sz="1800" dirty="0">
+                <a:latin typeface="+mj-lt"/>
+              </a:rPr>
+              <a:t>имеет небольшое число </a:t>
+            </a:r>
+            <a:r>
+              <a:rPr lang="ru-RU" sz="1800" dirty="0" err="1">
+                <a:latin typeface="+mj-lt"/>
+              </a:rPr>
+              <a:t>гиперпараметров</a:t>
+            </a:r>
+            <a:endParaRPr lang="en-US" sz="1800" dirty="0">
+              <a:latin typeface="+mj-lt"/>
+            </a:endParaRPr>
+          </a:p>
+          <a:p>
+            <a:pPr>
+              <a:buFontTx/>
+              <a:buChar char="-"/>
+            </a:pPr>
+            <a:r>
+              <a:rPr lang="ru-RU" sz="1800" dirty="0">
+                <a:latin typeface="+mj-lt"/>
+              </a:rPr>
+              <a:t>предоставляет удобные средства анализа важности признаков.</a:t>
+            </a:r>
           </a:p>
         </p:txBody>
       </p:sp>
@@ -6819,6 +7128,201 @@
 </p:sld>
 </file>
 
+<file path=ppt/slides/slide8.xml><?xml version="1.0" encoding="utf-8"?>
+<p:sld xmlns:a="http://schemas.openxmlformats.org/drawingml/2006/main" xmlns:r="http://schemas.openxmlformats.org/officeDocument/2006/relationships" xmlns:p="http://schemas.openxmlformats.org/presentationml/2006/main">
+  <p:cSld>
+    <p:spTree>
+      <p:nvGrpSpPr>
+        <p:cNvPr id="1" name=""/>
+        <p:cNvGrpSpPr/>
+        <p:nvPr/>
+      </p:nvGrpSpPr>
+      <p:grpSpPr>
+        <a:xfrm>
+          <a:off x="0" y="0"/>
+          <a:ext cx="0" cy="0"/>
+          <a:chOff x="0" y="0"/>
+          <a:chExt cx="0" cy="0"/>
+        </a:xfrm>
+      </p:grpSpPr>
+      <p:sp>
+        <p:nvSpPr>
+          <p:cNvPr id="2" name="Заголовок 1">
+            <a:extLst>
+              <a:ext uri="{FF2B5EF4-FFF2-40B4-BE49-F238E27FC236}">
+                <a16:creationId xmlns:a16="http://schemas.microsoft.com/office/drawing/2014/main" id="{125C15E5-A4EA-4E3B-93F1-36AD9EC493D6}"/>
+              </a:ext>
+            </a:extLst>
+          </p:cNvPr>
+          <p:cNvSpPr>
+            <a:spLocks noGrp="1"/>
+          </p:cNvSpPr>
+          <p:nvPr>
+            <p:ph type="title"/>
+          </p:nvPr>
+        </p:nvSpPr>
+        <p:spPr/>
+        <p:txBody>
+          <a:bodyPr/>
+          <a:lstStyle/>
+          <a:p>
+            <a:r>
+              <a:rPr lang="ru-RU" dirty="0" err="1"/>
+              <a:t>Датасет</a:t>
+            </a:r>
+            <a:r>
+              <a:rPr lang="en-US" dirty="0"/>
+              <a:t>: ESOL</a:t>
+            </a:r>
+            <a:endParaRPr lang="ru-RU" dirty="0"/>
+          </a:p>
+        </p:txBody>
+      </p:sp>
+      <p:sp>
+        <p:nvSpPr>
+          <p:cNvPr id="3" name="Объект 2">
+            <a:extLst>
+              <a:ext uri="{FF2B5EF4-FFF2-40B4-BE49-F238E27FC236}">
+                <a16:creationId xmlns:a16="http://schemas.microsoft.com/office/drawing/2014/main" id="{4E72603B-6201-4E76-B06A-DB7A4B0BB836}"/>
+              </a:ext>
+            </a:extLst>
+          </p:cNvPr>
+          <p:cNvSpPr>
+            <a:spLocks noGrp="1"/>
+          </p:cNvSpPr>
+          <p:nvPr>
+            <p:ph idx="1"/>
+          </p:nvPr>
+        </p:nvSpPr>
+        <p:spPr/>
+        <p:txBody>
+          <a:bodyPr/>
+          <a:lstStyle/>
+          <a:p>
+            <a:pPr marL="0" indent="0">
+              <a:buNone/>
+            </a:pPr>
+            <a:r>
+              <a:rPr lang="en-US" dirty="0">
+                <a:latin typeface="+mj-lt"/>
+              </a:rPr>
+              <a:t>ESOL (Estimated Solubility)</a:t>
+            </a:r>
+          </a:p>
+          <a:p>
+            <a:pPr>
+              <a:buFontTx/>
+              <a:buChar char="-"/>
+            </a:pPr>
+            <a:r>
+              <a:rPr lang="ru-RU" dirty="0">
+                <a:latin typeface="+mj-lt"/>
+              </a:rPr>
+              <a:t>целевое значение – </a:t>
+            </a:r>
+            <a:r>
+              <a:rPr lang="en-US" dirty="0" err="1">
+                <a:latin typeface="+mj-lt"/>
+              </a:rPr>
+              <a:t>logS</a:t>
+            </a:r>
+            <a:r>
+              <a:rPr lang="en-US" dirty="0">
+                <a:latin typeface="+mj-lt"/>
+              </a:rPr>
+              <a:t> – </a:t>
+            </a:r>
+            <a:r>
+              <a:rPr lang="ru-RU" dirty="0">
+                <a:latin typeface="+mj-lt"/>
+              </a:rPr>
+              <a:t>растворимость молекул</a:t>
+            </a:r>
+          </a:p>
+          <a:p>
+            <a:pPr>
+              <a:buFontTx/>
+              <a:buChar char="-"/>
+            </a:pPr>
+            <a:r>
+              <a:rPr lang="ru-RU" dirty="0">
+                <a:latin typeface="+mj-lt"/>
+              </a:rPr>
+              <a:t>1128 малых молекул</a:t>
+            </a:r>
+          </a:p>
+          <a:p>
+            <a:pPr>
+              <a:buFontTx/>
+              <a:buChar char="-"/>
+            </a:pPr>
+            <a:r>
+              <a:rPr lang="en-US" dirty="0">
+                <a:latin typeface="+mj-lt"/>
+              </a:rPr>
+              <a:t>SMILES, TPSA</a:t>
+            </a:r>
+          </a:p>
+          <a:p>
+            <a:pPr>
+              <a:buFontTx/>
+              <a:buChar char="-"/>
+            </a:pPr>
+            <a:r>
+              <a:rPr lang="ru-RU" dirty="0">
+                <a:latin typeface="+mj-lt"/>
+              </a:rPr>
+              <a:t>входит в открытую библиотеку </a:t>
+            </a:r>
+            <a:r>
+              <a:rPr lang="en-US" dirty="0" err="1">
+                <a:latin typeface="+mj-lt"/>
+              </a:rPr>
+              <a:t>DeepChem</a:t>
+            </a:r>
+            <a:endParaRPr lang="en-US" dirty="0">
+              <a:latin typeface="+mj-lt"/>
+            </a:endParaRPr>
+          </a:p>
+          <a:p>
+            <a:pPr>
+              <a:buFontTx/>
+              <a:buChar char="-"/>
+            </a:pPr>
+            <a:r>
+              <a:rPr lang="ru-RU" dirty="0">
+                <a:latin typeface="+mj-lt"/>
+              </a:rPr>
+              <a:t>представляет актуальное свойство</a:t>
+            </a:r>
+          </a:p>
+          <a:p>
+            <a:pPr>
+              <a:buFontTx/>
+              <a:buChar char="-"/>
+            </a:pPr>
+            <a:r>
+              <a:rPr lang="ru-RU" dirty="0">
+                <a:latin typeface="+mj-lt"/>
+              </a:rPr>
+              <a:t>совместим с различными архитектурами</a:t>
+            </a:r>
+          </a:p>
+        </p:txBody>
+      </p:sp>
+    </p:spTree>
+    <p:extLst>
+      <p:ext uri="{BB962C8B-B14F-4D97-AF65-F5344CB8AC3E}">
+        <p14:creationId xmlns:p14="http://schemas.microsoft.com/office/powerpoint/2010/main" val="494803387"/>
+      </p:ext>
+    </p:extLst>
+  </p:cSld>
+  <p:clrMapOvr>
+    <a:masterClrMapping/>
+  </p:clrMapOvr>
+</p:sld>
+</file>
+
 <file path=ppt/slides/slide9.xml><?xml version="1.0" encoding="utf-8"?>
 <p:sld xmlns:a="http://schemas.openxmlformats.org/drawingml/2006/main" xmlns:r="http://schemas.openxmlformats.org/officeDocument/2006/relationships" xmlns:p="http://schemas.openxmlformats.org/presentationml/2006/main">
   <p:cSld>
@@ -6841,7 +7345,7 @@
           <p:cNvPr id="2" name="Заголовок 1">
             <a:extLst>
               <a:ext uri="{FF2B5EF4-FFF2-40B4-BE49-F238E27FC236}">
-                <a16:creationId xmlns:a16="http://schemas.microsoft.com/office/drawing/2014/main" id="{125C15E5-A4EA-4E3B-93F1-36AD9EC493D6}"/>
+                <a16:creationId xmlns:a16="http://schemas.microsoft.com/office/drawing/2014/main" id="{2DCFF16B-D823-49E3-BBDE-F52E609D9D61}"/>
               </a:ext>
             </a:extLst>
           </p:cNvPr>
@@ -6861,6 +7365,10 @@
               <a:rPr lang="ru-RU" dirty="0" err="1"/>
               <a:t>Датасет</a:t>
             </a:r>
+            <a:r>
+              <a:rPr lang="en-US" dirty="0"/>
+              <a:t>: ESOL</a:t>
+            </a:r>
             <a:endParaRPr lang="ru-RU" dirty="0"/>
           </a:p>
         </p:txBody>
@@ -6870,7 +7378,7 @@
           <p:cNvPr id="3" name="Объект 2">
             <a:extLst>
               <a:ext uri="{FF2B5EF4-FFF2-40B4-BE49-F238E27FC236}">
-                <a16:creationId xmlns:a16="http://schemas.microsoft.com/office/drawing/2014/main" id="{4E72603B-6201-4E76-B06A-DB7A4B0BB836}"/>
+                <a16:creationId xmlns:a16="http://schemas.microsoft.com/office/drawing/2014/main" id="{1BE8CEDD-3CD3-4238-8944-00FD9894B6A0}"/>
               </a:ext>
             </a:extLst>
           </p:cNvPr>
@@ -6890,10 +7398,22 @@
               <a:buNone/>
             </a:pPr>
             <a:r>
-              <a:rPr lang="en-US" dirty="0">
-                <a:latin typeface="+mj-lt"/>
-              </a:rPr>
-              <a:t>ESOL (Estimated Solubility)</a:t>
+              <a:rPr lang="ru-RU" dirty="0">
+                <a:latin typeface="+mj-lt"/>
+              </a:rPr>
+              <a:t>Обработка </a:t>
+            </a:r>
+            <a:r>
+              <a:rPr lang="ru-RU" dirty="0" err="1">
+                <a:latin typeface="+mj-lt"/>
+              </a:rPr>
+              <a:t>датасета</a:t>
+            </a:r>
+            <a:r>
+              <a:rPr lang="ru-RU" dirty="0">
+                <a:latin typeface="+mj-lt"/>
+              </a:rPr>
+              <a:t>:</a:t>
             </a:r>
           </a:p>
           <a:p>
@@ -6902,41 +7422,41 @@
               <a:buChar char="-"/>
             </a:pPr>
             <a:r>
-              <a:rPr lang="ru-RU" dirty="0">
-                <a:latin typeface="+mj-lt"/>
-              </a:rPr>
-              <a:t>Целевое значение – </a:t>
-            </a:r>
-            <a:r>
-              <a:rPr lang="en-US" dirty="0" err="1">
+              <a:rPr lang="ru-RU" sz="2000" dirty="0" err="1">
+                <a:latin typeface="+mj-lt"/>
+              </a:rPr>
+              <a:t>таргет</a:t>
+            </a:r>
+            <a:r>
+              <a:rPr lang="ru-RU" sz="2000" dirty="0">
+                <a:latin typeface="+mj-lt"/>
+              </a:rPr>
+              <a:t> </a:t>
+            </a:r>
+            <a:r>
+              <a:rPr lang="ru-RU" sz="2000" dirty="0" err="1">
                 <a:latin typeface="+mj-lt"/>
               </a:rPr>
               <a:t>logS</a:t>
             </a:r>
             <a:r>
-              <a:rPr lang="en-US" dirty="0">
-                <a:latin typeface="+mj-lt"/>
-              </a:rPr>
-              <a:t> – </a:t>
-            </a:r>
-            <a:r>
-              <a:rPr lang="ru-RU" dirty="0">
-                <a:latin typeface="+mj-lt"/>
-              </a:rPr>
-              <a:t>растворимость молекул</a:t>
-            </a:r>
+              <a:rPr lang="ru-RU" sz="2000" dirty="0">
+                <a:latin typeface="+mj-lt"/>
+              </a:rPr>
+              <a:t> был собран автором из экспериментальных публикаций, химических справочников и научной литературы и экспериментальные базы данных в фармацевтической и агрохимической промышленности</a:t>
+            </a:r>
+            <a:endParaRPr lang="en-US" sz="2000" dirty="0">
+              <a:latin typeface="+mj-lt"/>
+            </a:endParaRPr>
           </a:p>
           <a:p>
             <a:pPr>
               <a:buFontTx/>
               <a:buChar char="-"/>
             </a:pPr>
-            <a:r>
-              <a:rPr lang="ru-RU" dirty="0">
-                <a:latin typeface="+mj-lt"/>
-              </a:rPr>
-              <a:t>1128 малых молекул</a:t>
-            </a:r>
+            <a:endParaRPr lang="ru-RU" sz="2000" dirty="0">
+              <a:latin typeface="+mj-lt"/>
+            </a:endParaRPr>
           </a:p>
           <a:p>
             <a:pPr>
@@ -6944,11 +7464,39 @@
               <a:buChar char="-"/>
             </a:pPr>
             <a:r>
-              <a:rPr lang="en-US" dirty="0">
-                <a:latin typeface="+mj-lt"/>
-              </a:rPr>
-              <a:t>SMILES</a:t>
-            </a:r>
+              <a:rPr lang="ru-RU" sz="2000" dirty="0">
+                <a:latin typeface="+mj-lt"/>
+              </a:rPr>
+              <a:t>молекулы, содержащие нестабильные фрагменты, сильно ионизированные формы или редкие атомы, были исключены</a:t>
+            </a:r>
+            <a:endParaRPr lang="en-US" sz="2000" dirty="0">
+              <a:latin typeface="+mj-lt"/>
+            </a:endParaRPr>
+          </a:p>
+          <a:p>
+            <a:pPr>
+              <a:buFontTx/>
+              <a:buChar char="-"/>
+            </a:pPr>
+            <a:endParaRPr lang="ru-RU" sz="2000" dirty="0">
+              <a:latin typeface="+mj-lt"/>
+            </a:endParaRPr>
+          </a:p>
+          <a:p>
+            <a:pPr marL="0" indent="0">
+              <a:buNone/>
+            </a:pPr>
+            <a:r>
+              <a:rPr lang="ru-RU" sz="2000" dirty="0">
+                <a:latin typeface="+mj-lt"/>
+              </a:rPr>
+              <a:t>- все молекулы были приведены к формату SMILES для универсального описания структуры </a:t>
+            </a:r>
+          </a:p>
+          <a:p>
+            <a:pPr marL="0" indent="0">
+              <a:buNone/>
+            </a:pPr>
             <a:endParaRPr lang="ru-RU" dirty="0">
               <a:latin typeface="+mj-lt"/>
             </a:endParaRPr>
@@ -6958,7 +7506,7 @@
     </p:spTree>
     <p:extLst>
       <p:ext uri="{BB962C8B-B14F-4D97-AF65-F5344CB8AC3E}">
-        <p14:creationId xmlns:p14="http://schemas.microsoft.com/office/powerpoint/2010/main" val="494803387"/>
+        <p14:creationId xmlns:p14="http://schemas.microsoft.com/office/powerpoint/2010/main" val="3356951020"/>
       </p:ext>
     </p:extLst>
   </p:cSld>

</xml_diff>

<commit_message>
course paper 2025: fix
</commit_message>
<xml_diff>
--- a/sem_6/course_paper/course_paper/Snezhko_course_paper.pptx
+++ b/sem_6/course_paper/course_paper/Snezhko_course_paper.pptx
@@ -15,9 +15,8 @@
     <p:sldId id="264" r:id="rId9"/>
     <p:sldId id="268" r:id="rId10"/>
     <p:sldId id="265" r:id="rId11"/>
-    <p:sldId id="266" r:id="rId12"/>
-    <p:sldId id="269" r:id="rId13"/>
-    <p:sldId id="267" r:id="rId14"/>
+    <p:sldId id="269" r:id="rId12"/>
+    <p:sldId id="267" r:id="rId13"/>
   </p:sldIdLst>
   <p:sldSz cx="12192000" cy="6858000"/>
   <p:notesSz cx="6858000" cy="9144000"/>
@@ -3525,7 +3524,12 @@
             <p:ph type="title"/>
           </p:nvPr>
         </p:nvSpPr>
-        <p:spPr/>
+        <p:spPr>
+          <a:xfrm>
+            <a:off x="518283" y="-148770"/>
+            <a:ext cx="10515600" cy="1325563"/>
+          </a:xfrm>
+        </p:spPr>
         <p:txBody>
           <a:bodyPr/>
           <a:lstStyle/>
@@ -3551,11 +3555,16 @@
           </p:cNvGraphicFramePr>
           <p:nvPr>
             <p:ph idx="1"/>
+            <p:extLst>
+              <p:ext uri="{D42A27DB-BD31-4B8C-83A1-F6EECF244321}">
+                <p14:modId xmlns:p14="http://schemas.microsoft.com/office/powerpoint/2010/main" val="1602899589"/>
+              </p:ext>
+            </p:extLst>
           </p:nvPr>
         </p:nvGraphicFramePr>
         <p:xfrm>
-          <a:off x="3128962" y="3574954"/>
-          <a:ext cx="5934075" cy="868936"/>
+          <a:off x="518283" y="834887"/>
+          <a:ext cx="10669203" cy="2425146"/>
         </p:xfrm>
         <a:graphic>
           <a:graphicData uri="http://schemas.openxmlformats.org/drawingml/2006/table">
@@ -3564,21 +3573,21 @@
                 <a:tableStyleId>{5C22544A-7EE6-4342-B048-85BDC9FD1C3A}</a:tableStyleId>
               </a:tblPr>
               <a:tblGrid>
-                <a:gridCol w="1978025">
+                <a:gridCol w="3556401">
                   <a:extLst>
                     <a:ext uri="{9D8B030D-6E8A-4147-A177-3AD203B41FA5}">
                       <a16:colId xmlns:a16="http://schemas.microsoft.com/office/drawing/2014/main" val="2573956849"/>
                     </a:ext>
                   </a:extLst>
                 </a:gridCol>
-                <a:gridCol w="1978025">
+                <a:gridCol w="3556401">
                   <a:extLst>
                     <a:ext uri="{9D8B030D-6E8A-4147-A177-3AD203B41FA5}">
                       <a16:colId xmlns:a16="http://schemas.microsoft.com/office/drawing/2014/main" val="1556285428"/>
                     </a:ext>
                   </a:extLst>
                 </a:gridCol>
-                <a:gridCol w="1978025">
+                <a:gridCol w="3556401">
                   <a:extLst>
                     <a:ext uri="{9D8B030D-6E8A-4147-A177-3AD203B41FA5}">
                       <a16:colId xmlns:a16="http://schemas.microsoft.com/office/drawing/2014/main" val="3599655211"/>
@@ -3586,7 +3595,7 @@
                   </a:extLst>
                 </a:gridCol>
               </a:tblGrid>
-              <a:tr h="0">
+              <a:tr h="440947">
                 <a:tc>
                   <a:txBody>
                     <a:bodyPr/>
@@ -3630,12 +3639,12 @@
                         </a:spcAft>
                       </a:pPr>
                       <a:r>
-                        <a:rPr lang="en-US" sz="1400">
+                        <a:rPr lang="en-US" sz="1400" dirty="0">
                           <a:effectLst/>
                         </a:rPr>
                         <a:t>RMSE</a:t>
                       </a:r>
-                      <a:endParaRPr lang="ru-RU" sz="1400">
+                      <a:endParaRPr lang="ru-RU" sz="1400" dirty="0">
                         <a:effectLst/>
                         <a:latin typeface="Times New Roman" panose="02020603050405020304" pitchFamily="18" charset="0"/>
                         <a:ea typeface="Calibri" panose="020F0502020204030204" pitchFamily="34" charset="0"/>
@@ -3643,7 +3652,11 @@
                       </a:endParaRPr>
                     </a:p>
                   </a:txBody>
-                  <a:tcPr marL="68580" marR="68580" marT="0" marB="0"/>
+                  <a:tcPr marL="68580" marR="68580" marT="0" marB="0">
+                    <a:lnB w="38100" cmpd="sng">
+                      <a:noFill/>
+                    </a:lnB>
+                  </a:tcPr>
                 </a:tc>
                 <a:tc>
                   <a:txBody>
@@ -3659,18 +3672,18 @@
                         </a:spcAft>
                       </a:pPr>
                       <a:r>
-                        <a:rPr lang="en-US" sz="1400">
+                        <a:rPr lang="en-US" sz="1400" dirty="0">
                           <a:effectLst/>
                         </a:rPr>
                         <a:t>R</a:t>
                       </a:r>
                       <a:r>
-                        <a:rPr lang="en-US" sz="1400" baseline="30000">
+                        <a:rPr lang="en-US" sz="1400" baseline="30000" dirty="0">
                           <a:effectLst/>
                         </a:rPr>
                         <a:t>2</a:t>
                       </a:r>
-                      <a:endParaRPr lang="ru-RU" sz="1400">
+                      <a:endParaRPr lang="ru-RU" sz="1400" dirty="0">
                         <a:effectLst/>
                         <a:latin typeface="Times New Roman" panose="02020603050405020304" pitchFamily="18" charset="0"/>
                         <a:ea typeface="Calibri" panose="020F0502020204030204" pitchFamily="34" charset="0"/>
@@ -3686,7 +3699,7 @@
                   </a:ext>
                 </a:extLst>
               </a:tr>
-              <a:tr h="0">
+              <a:tr h="440947">
                 <a:tc>
                   <a:txBody>
                     <a:bodyPr/>
@@ -3714,7 +3727,11 @@
                       </a:endParaRPr>
                     </a:p>
                   </a:txBody>
-                  <a:tcPr marL="68580" marR="68580" marT="0" marB="0"/>
+                  <a:tcPr marL="68580" marR="68580" marT="0" marB="0">
+                    <a:lnR w="12700" cmpd="sng">
+                      <a:noFill/>
+                    </a:lnR>
+                  </a:tcPr>
                 </a:tc>
                 <a:tc>
                   <a:txBody>
@@ -3730,12 +3747,102 @@
                         </a:spcAft>
                       </a:pPr>
                       <a:r>
-                        <a:rPr lang="ru-RU" sz="1400">
+                        <a:rPr lang="ru-RU" sz="2400" dirty="0">
                           <a:effectLst/>
                         </a:rPr>
                         <a:t>0.63</a:t>
                       </a:r>
-                      <a:endParaRPr lang="ru-RU" sz="1400">
+                      <a:endParaRPr lang="ru-RU" sz="2000" dirty="0">
+                        <a:effectLst/>
+                        <a:latin typeface="Times New Roman" panose="02020603050405020304" pitchFamily="18" charset="0"/>
+                        <a:ea typeface="Calibri" panose="020F0502020204030204" pitchFamily="34" charset="0"/>
+                        <a:cs typeface="Times New Roman" panose="02020603050405020304" pitchFamily="18" charset="0"/>
+                      </a:endParaRPr>
+                    </a:p>
+                  </a:txBody>
+                  <a:tcPr marL="68580" marR="68580" marT="0" marB="0">
+                    <a:lnL w="12700" cmpd="sng">
+                      <a:noFill/>
+                    </a:lnL>
+                    <a:lnR w="12700" cmpd="sng">
+                      <a:noFill/>
+                    </a:lnR>
+                    <a:lnT w="38100" cmpd="sng">
+                      <a:noFill/>
+                    </a:lnT>
+                    <a:lnB w="12700" cmpd="sng">
+                      <a:noFill/>
+                    </a:lnB>
+                    <a:lnTlToBr w="12700" cmpd="sng">
+                      <a:noFill/>
+                      <a:prstDash val="solid"/>
+                    </a:lnTlToBr>
+                    <a:lnBlToTr w="12700" cmpd="sng">
+                      <a:noFill/>
+                      <a:prstDash val="solid"/>
+                    </a:lnBlToTr>
+                  </a:tcPr>
+                </a:tc>
+                <a:tc>
+                  <a:txBody>
+                    <a:bodyPr/>
+                    <a:lstStyle/>
+                    <a:p>
+                      <a:pPr>
+                        <a:lnSpc>
+                          <a:spcPts val="1800"/>
+                        </a:lnSpc>
+                        <a:spcAft>
+                          <a:spcPts val="800"/>
+                        </a:spcAft>
+                      </a:pPr>
+                      <a:r>
+                        <a:rPr lang="ru-RU" sz="2400" dirty="0">
+                          <a:effectLst/>
+                        </a:rPr>
+                        <a:t>0.78</a:t>
+                      </a:r>
+                      <a:endParaRPr lang="ru-RU" sz="2000" dirty="0">
+                        <a:effectLst/>
+                        <a:latin typeface="Times New Roman" panose="02020603050405020304" pitchFamily="18" charset="0"/>
+                        <a:ea typeface="Calibri" panose="020F0502020204030204" pitchFamily="34" charset="0"/>
+                        <a:cs typeface="Times New Roman" panose="02020603050405020304" pitchFamily="18" charset="0"/>
+                      </a:endParaRPr>
+                    </a:p>
+                  </a:txBody>
+                  <a:tcPr marL="68580" marR="68580" marT="0" marB="0">
+                    <a:lnL w="12700" cmpd="sng">
+                      <a:noFill/>
+                    </a:lnL>
+                  </a:tcPr>
+                </a:tc>
+                <a:extLst>
+                  <a:ext uri="{0D108BD9-81ED-4DB2-BD59-A6C34878D82A}">
+                    <a16:rowId xmlns:a16="http://schemas.microsoft.com/office/drawing/2014/main" val="765955263"/>
+                  </a:ext>
+                </a:extLst>
+              </a:tr>
+              <a:tr h="771626">
+                <a:tc>
+                  <a:txBody>
+                    <a:bodyPr/>
+                    <a:lstStyle/>
+                    <a:p>
+                      <a:pPr>
+                        <a:lnSpc>
+                          <a:spcPts val="1800"/>
+                        </a:lnSpc>
+                        <a:spcAft>
+                          <a:spcPts val="800"/>
+                        </a:spcAft>
+                      </a:pPr>
+                      <a:r>
+                        <a:rPr lang="en-US" sz="1400" dirty="0">
+                          <a:effectLst/>
+                        </a:rPr>
+                        <a:t>GCN</a:t>
+                      </a:r>
+                      <a:endParaRPr lang="ru-RU" sz="1400" dirty="0">
                         <a:effectLst/>
                         <a:latin typeface="Times New Roman" panose="02020603050405020304" pitchFamily="18" charset="0"/>
                         <a:ea typeface="Calibri" panose="020F0502020204030204" pitchFamily="34" charset="0"/>
@@ -3759,12 +3866,12 @@
                         </a:spcAft>
                       </a:pPr>
                       <a:r>
-                        <a:rPr lang="ru-RU" sz="1400">
+                        <a:rPr lang="ru-RU" sz="2400" dirty="0">
                           <a:effectLst/>
                         </a:rPr>
-                        <a:t>0.78</a:t>
+                        <a:t>1.04</a:t>
                       </a:r>
-                      <a:endParaRPr lang="ru-RU" sz="1400">
+                      <a:endParaRPr lang="ru-RU" sz="2000" dirty="0">
                         <a:effectLst/>
                         <a:latin typeface="Times New Roman" panose="02020603050405020304" pitchFamily="18" charset="0"/>
                         <a:ea typeface="Calibri" panose="020F0502020204030204" pitchFamily="34" charset="0"/>
@@ -3772,15 +3879,12 @@
                       </a:endParaRPr>
                     </a:p>
                   </a:txBody>
-                  <a:tcPr marL="68580" marR="68580" marT="0" marB="0"/>
+                  <a:tcPr marL="68580" marR="68580" marT="0" marB="0">
+                    <a:lnT w="12700" cmpd="sng">
+                      <a:noFill/>
+                    </a:lnT>
+                  </a:tcPr>
                 </a:tc>
-                <a:extLst>
-                  <a:ext uri="{0D108BD9-81ED-4DB2-BD59-A6C34878D82A}">
-                    <a16:rowId xmlns:a16="http://schemas.microsoft.com/office/drawing/2014/main" val="765955263"/>
-                  </a:ext>
-                </a:extLst>
-              </a:tr>
-              <a:tr h="0">
                 <a:tc>
                   <a:txBody>
                     <a:bodyPr/>
@@ -3795,12 +3899,48 @@
                         </a:spcAft>
                       </a:pPr>
                       <a:r>
-                        <a:rPr lang="en-US" sz="1400">
+                        <a:rPr lang="ru-RU" sz="2400" dirty="0">
                           <a:effectLst/>
                         </a:rPr>
-                        <a:t>GCN</a:t>
+                        <a:t>0.77</a:t>
                       </a:r>
-                      <a:endParaRPr lang="ru-RU" sz="1400">
+                      <a:endParaRPr lang="ru-RU" sz="1400" dirty="0">
+                        <a:effectLst/>
+                        <a:latin typeface="Times New Roman" panose="02020603050405020304" pitchFamily="18" charset="0"/>
+                        <a:ea typeface="Calibri" panose="020F0502020204030204" pitchFamily="34" charset="0"/>
+                        <a:cs typeface="Times New Roman" panose="02020603050405020304" pitchFamily="18" charset="0"/>
+                      </a:endParaRPr>
+                    </a:p>
+                  </a:txBody>
+                  <a:tcPr marL="68580" marR="68580" marT="0" marB="0"/>
+                </a:tc>
+                <a:extLst>
+                  <a:ext uri="{0D108BD9-81ED-4DB2-BD59-A6C34878D82A}">
+                    <a16:rowId xmlns:a16="http://schemas.microsoft.com/office/drawing/2014/main" val="2633256286"/>
+                  </a:ext>
+                </a:extLst>
+              </a:tr>
+              <a:tr h="771626">
+                <a:tc>
+                  <a:txBody>
+                    <a:bodyPr/>
+                    <a:lstStyle/>
+                    <a:p>
+                      <a:pPr>
+                        <a:lnSpc>
+                          <a:spcPts val="1800"/>
+                        </a:lnSpc>
+                        <a:spcAft>
+                          <a:spcPts val="800"/>
+                        </a:spcAft>
+                      </a:pPr>
+                      <a:r>
+                        <a:rPr lang="en-US" sz="1400" dirty="0">
+                          <a:effectLst/>
+                        </a:rPr>
+                        <a:t>RF</a:t>
+                      </a:r>
+                      <a:endParaRPr lang="ru-RU" sz="1400" dirty="0">
                         <a:effectLst/>
                         <a:latin typeface="Times New Roman" panose="02020603050405020304" pitchFamily="18" charset="0"/>
                         <a:ea typeface="Calibri" panose="020F0502020204030204" pitchFamily="34" charset="0"/>
@@ -3824,12 +3964,12 @@
                         </a:spcAft>
                       </a:pPr>
                       <a:r>
-                        <a:rPr lang="ru-RU" sz="1400">
+                        <a:rPr lang="ru-RU" sz="2400" dirty="0">
                           <a:effectLst/>
                         </a:rPr>
-                        <a:t>1.04</a:t>
+                        <a:t>0.586</a:t>
                       </a:r>
-                      <a:endParaRPr lang="ru-RU" sz="1400">
+                      <a:endParaRPr lang="ru-RU" sz="2000" dirty="0">
                         <a:effectLst/>
                         <a:latin typeface="Times New Roman" panose="02020603050405020304" pitchFamily="18" charset="0"/>
                         <a:ea typeface="Calibri" panose="020F0502020204030204" pitchFamily="34" charset="0"/>
@@ -3853,101 +3993,7 @@
                         </a:spcAft>
                       </a:pPr>
                       <a:r>
-                        <a:rPr lang="ru-RU" sz="1400">
-                          <a:effectLst/>
-                        </a:rPr>
-                        <a:t>0.77</a:t>
-                      </a:r>
-                      <a:endParaRPr lang="ru-RU" sz="1400">
-                        <a:effectLst/>
-                        <a:latin typeface="Times New Roman" panose="02020603050405020304" pitchFamily="18" charset="0"/>
-                        <a:ea typeface="Calibri" panose="020F0502020204030204" pitchFamily="34" charset="0"/>
-                        <a:cs typeface="Times New Roman" panose="02020603050405020304" pitchFamily="18" charset="0"/>
-                      </a:endParaRPr>
-                    </a:p>
-                  </a:txBody>
-                  <a:tcPr marL="68580" marR="68580" marT="0" marB="0"/>
-                </a:tc>
-                <a:extLst>
-                  <a:ext uri="{0D108BD9-81ED-4DB2-BD59-A6C34878D82A}">
-                    <a16:rowId xmlns:a16="http://schemas.microsoft.com/office/drawing/2014/main" val="2633256286"/>
-                  </a:ext>
-                </a:extLst>
-              </a:tr>
-              <a:tr h="0">
-                <a:tc>
-                  <a:txBody>
-                    <a:bodyPr/>
-                    <a:lstStyle/>
-                    <a:p>
-                      <a:pPr>
-                        <a:lnSpc>
-                          <a:spcPts val="1800"/>
-                        </a:lnSpc>
-                        <a:spcAft>
-                          <a:spcPts val="800"/>
-                        </a:spcAft>
-                      </a:pPr>
-                      <a:r>
-                        <a:rPr lang="en-US" sz="1400">
-                          <a:effectLst/>
-                        </a:rPr>
-                        <a:t>RF</a:t>
-                      </a:r>
-                      <a:endParaRPr lang="ru-RU" sz="1400">
-                        <a:effectLst/>
-                        <a:latin typeface="Times New Roman" panose="02020603050405020304" pitchFamily="18" charset="0"/>
-                        <a:ea typeface="Calibri" panose="020F0502020204030204" pitchFamily="34" charset="0"/>
-                        <a:cs typeface="Times New Roman" panose="02020603050405020304" pitchFamily="18" charset="0"/>
-                      </a:endParaRPr>
-                    </a:p>
-                  </a:txBody>
-                  <a:tcPr marL="68580" marR="68580" marT="0" marB="0"/>
-                </a:tc>
-                <a:tc>
-                  <a:txBody>
-                    <a:bodyPr/>
-                    <a:lstStyle/>
-                    <a:p>
-                      <a:pPr>
-                        <a:lnSpc>
-                          <a:spcPts val="1800"/>
-                        </a:lnSpc>
-                        <a:spcAft>
-                          <a:spcPts val="800"/>
-                        </a:spcAft>
-                      </a:pPr>
-                      <a:r>
-                        <a:rPr lang="ru-RU" sz="1400">
-                          <a:effectLst/>
-                        </a:rPr>
-                        <a:t>0.586</a:t>
-                      </a:r>
-                      <a:endParaRPr lang="ru-RU" sz="1400">
-                        <a:effectLst/>
-                        <a:latin typeface="Times New Roman" panose="02020603050405020304" pitchFamily="18" charset="0"/>
-                        <a:ea typeface="Calibri" panose="020F0502020204030204" pitchFamily="34" charset="0"/>
-                        <a:cs typeface="Times New Roman" panose="02020603050405020304" pitchFamily="18" charset="0"/>
-                      </a:endParaRPr>
-                    </a:p>
-                  </a:txBody>
-                  <a:tcPr marL="68580" marR="68580" marT="0" marB="0"/>
-                </a:tc>
-                <a:tc>
-                  <a:txBody>
-                    <a:bodyPr/>
-                    <a:lstStyle/>
-                    <a:p>
-                      <a:pPr>
-                        <a:lnSpc>
-                          <a:spcPts val="1800"/>
-                        </a:lnSpc>
-                        <a:spcAft>
-                          <a:spcPts val="800"/>
-                        </a:spcAft>
-                      </a:pPr>
-                      <a:r>
-                        <a:rPr lang="ru-RU" sz="1400" dirty="0">
+                        <a:rPr lang="ru-RU" sz="2400" dirty="0">
                           <a:effectLst/>
                         </a:rPr>
                         <a:t>0.619</a:t>
@@ -3972,6 +4018,441 @@
           </a:graphicData>
         </a:graphic>
       </p:graphicFrame>
+      <p:sp>
+        <p:nvSpPr>
+          <p:cNvPr id="5" name="Объект 2">
+            <a:extLst>
+              <a:ext uri="{FF2B5EF4-FFF2-40B4-BE49-F238E27FC236}">
+                <a16:creationId xmlns:a16="http://schemas.microsoft.com/office/drawing/2014/main" id="{1938A0AA-C946-492E-8EA5-5627341B90DF}"/>
+              </a:ext>
+            </a:extLst>
+          </p:cNvPr>
+          <p:cNvSpPr txBox="1">
+            <a:spLocks/>
+          </p:cNvSpPr>
+          <p:nvPr/>
+        </p:nvSpPr>
+        <p:spPr>
+          <a:xfrm>
+            <a:off x="424732" y="3534837"/>
+            <a:ext cx="4139317" cy="4351338"/>
+          </a:xfrm>
+          <a:prstGeom prst="rect">
+            <a:avLst/>
+          </a:prstGeom>
+        </p:spPr>
+        <p:txBody>
+          <a:bodyPr vert="horz" lIns="91440" tIns="45720" rIns="91440" bIns="45720" rtlCol="0">
+            <a:normAutofit/>
+          </a:bodyPr>
+          <a:lstStyle>
+            <a:lvl1pPr marL="228600" indent="-228600" algn="l" defTabSz="914400" rtl="0" eaLnBrk="1" latinLnBrk="0" hangingPunct="1">
+              <a:lnSpc>
+                <a:spcPct val="90000"/>
+              </a:lnSpc>
+              <a:spcBef>
+                <a:spcPts val="1000"/>
+              </a:spcBef>
+              <a:buFont typeface="Arial" panose="020B0604020202020204" pitchFamily="34" charset="0"/>
+              <a:buChar char="•"/>
+              <a:defRPr sz="2800" kern="1200">
+                <a:solidFill>
+                  <a:schemeClr val="tx1"/>
+                </a:solidFill>
+                <a:latin typeface="+mn-lt"/>
+                <a:ea typeface="+mn-ea"/>
+                <a:cs typeface="+mn-cs"/>
+              </a:defRPr>
+            </a:lvl1pPr>
+            <a:lvl2pPr marL="685800" indent="-228600" algn="l" defTabSz="914400" rtl="0" eaLnBrk="1" latinLnBrk="0" hangingPunct="1">
+              <a:lnSpc>
+                <a:spcPct val="90000"/>
+              </a:lnSpc>
+              <a:spcBef>
+                <a:spcPts val="500"/>
+              </a:spcBef>
+              <a:buFont typeface="Arial" panose="020B0604020202020204" pitchFamily="34" charset="0"/>
+              <a:buChar char="•"/>
+              <a:defRPr sz="2400" kern="1200">
+                <a:solidFill>
+                  <a:schemeClr val="tx1"/>
+                </a:solidFill>
+                <a:latin typeface="+mn-lt"/>
+                <a:ea typeface="+mn-ea"/>
+                <a:cs typeface="+mn-cs"/>
+              </a:defRPr>
+            </a:lvl2pPr>
+            <a:lvl3pPr marL="1143000" indent="-228600" algn="l" defTabSz="914400" rtl="0" eaLnBrk="1" latinLnBrk="0" hangingPunct="1">
+              <a:lnSpc>
+                <a:spcPct val="90000"/>
+              </a:lnSpc>
+              <a:spcBef>
+                <a:spcPts val="500"/>
+              </a:spcBef>
+              <a:buFont typeface="Arial" panose="020B0604020202020204" pitchFamily="34" charset="0"/>
+              <a:buChar char="•"/>
+              <a:defRPr sz="2000" kern="1200">
+                <a:solidFill>
+                  <a:schemeClr val="tx1"/>
+                </a:solidFill>
+                <a:latin typeface="+mn-lt"/>
+                <a:ea typeface="+mn-ea"/>
+                <a:cs typeface="+mn-cs"/>
+              </a:defRPr>
+            </a:lvl3pPr>
+            <a:lvl4pPr marL="1600200" indent="-228600" algn="l" defTabSz="914400" rtl="0" eaLnBrk="1" latinLnBrk="0" hangingPunct="1">
+              <a:lnSpc>
+                <a:spcPct val="90000"/>
+              </a:lnSpc>
+              <a:spcBef>
+                <a:spcPts val="500"/>
+              </a:spcBef>
+              <a:buFont typeface="Arial" panose="020B0604020202020204" pitchFamily="34" charset="0"/>
+              <a:buChar char="•"/>
+              <a:defRPr sz="1800" kern="1200">
+                <a:solidFill>
+                  <a:schemeClr val="tx1"/>
+                </a:solidFill>
+                <a:latin typeface="+mn-lt"/>
+                <a:ea typeface="+mn-ea"/>
+                <a:cs typeface="+mn-cs"/>
+              </a:defRPr>
+            </a:lvl4pPr>
+            <a:lvl5pPr marL="2057400" indent="-228600" algn="l" defTabSz="914400" rtl="0" eaLnBrk="1" latinLnBrk="0" hangingPunct="1">
+              <a:lnSpc>
+                <a:spcPct val="90000"/>
+              </a:lnSpc>
+              <a:spcBef>
+                <a:spcPts val="500"/>
+              </a:spcBef>
+              <a:buFont typeface="Arial" panose="020B0604020202020204" pitchFamily="34" charset="0"/>
+              <a:buChar char="•"/>
+              <a:defRPr sz="1800" kern="1200">
+                <a:solidFill>
+                  <a:schemeClr val="tx1"/>
+                </a:solidFill>
+                <a:latin typeface="+mn-lt"/>
+                <a:ea typeface="+mn-ea"/>
+                <a:cs typeface="+mn-cs"/>
+              </a:defRPr>
+            </a:lvl5pPr>
+            <a:lvl6pPr marL="2514600" indent="-228600" algn="l" defTabSz="914400" rtl="0" eaLnBrk="1" latinLnBrk="0" hangingPunct="1">
+              <a:lnSpc>
+                <a:spcPct val="90000"/>
+              </a:lnSpc>
+              <a:spcBef>
+                <a:spcPts val="500"/>
+              </a:spcBef>
+              <a:buFont typeface="Arial" panose="020B0604020202020204" pitchFamily="34" charset="0"/>
+              <a:buChar char="•"/>
+              <a:defRPr sz="1800" kern="1200">
+                <a:solidFill>
+                  <a:schemeClr val="tx1"/>
+                </a:solidFill>
+                <a:latin typeface="+mn-lt"/>
+                <a:ea typeface="+mn-ea"/>
+                <a:cs typeface="+mn-cs"/>
+              </a:defRPr>
+            </a:lvl6pPr>
+            <a:lvl7pPr marL="2971800" indent="-228600" algn="l" defTabSz="914400" rtl="0" eaLnBrk="1" latinLnBrk="0" hangingPunct="1">
+              <a:lnSpc>
+                <a:spcPct val="90000"/>
+              </a:lnSpc>
+              <a:spcBef>
+                <a:spcPts val="500"/>
+              </a:spcBef>
+              <a:buFont typeface="Arial" panose="020B0604020202020204" pitchFamily="34" charset="0"/>
+              <a:buChar char="•"/>
+              <a:defRPr sz="1800" kern="1200">
+                <a:solidFill>
+                  <a:schemeClr val="tx1"/>
+                </a:solidFill>
+                <a:latin typeface="+mn-lt"/>
+                <a:ea typeface="+mn-ea"/>
+                <a:cs typeface="+mn-cs"/>
+              </a:defRPr>
+            </a:lvl7pPr>
+            <a:lvl8pPr marL="3429000" indent="-228600" algn="l" defTabSz="914400" rtl="0" eaLnBrk="1" latinLnBrk="0" hangingPunct="1">
+              <a:lnSpc>
+                <a:spcPct val="90000"/>
+              </a:lnSpc>
+              <a:spcBef>
+                <a:spcPts val="500"/>
+              </a:spcBef>
+              <a:buFont typeface="Arial" panose="020B0604020202020204" pitchFamily="34" charset="0"/>
+              <a:buChar char="•"/>
+              <a:defRPr sz="1800" kern="1200">
+                <a:solidFill>
+                  <a:schemeClr val="tx1"/>
+                </a:solidFill>
+                <a:latin typeface="+mn-lt"/>
+                <a:ea typeface="+mn-ea"/>
+                <a:cs typeface="+mn-cs"/>
+              </a:defRPr>
+            </a:lvl8pPr>
+            <a:lvl9pPr marL="3886200" indent="-228600" algn="l" defTabSz="914400" rtl="0" eaLnBrk="1" latinLnBrk="0" hangingPunct="1">
+              <a:lnSpc>
+                <a:spcPct val="90000"/>
+              </a:lnSpc>
+              <a:spcBef>
+                <a:spcPts val="500"/>
+              </a:spcBef>
+              <a:buFont typeface="Arial" panose="020B0604020202020204" pitchFamily="34" charset="0"/>
+              <a:buChar char="•"/>
+              <a:defRPr sz="1800" kern="1200">
+                <a:solidFill>
+                  <a:schemeClr val="tx1"/>
+                </a:solidFill>
+                <a:latin typeface="+mn-lt"/>
+                <a:ea typeface="+mn-ea"/>
+                <a:cs typeface="+mn-cs"/>
+              </a:defRPr>
+            </a:lvl9pPr>
+          </a:lstStyle>
+          <a:p>
+            <a:pPr marL="0" indent="0">
+              <a:buFont typeface="Arial" panose="020B0604020202020204" pitchFamily="34" charset="0"/>
+              <a:buNone/>
+            </a:pPr>
+            <a:r>
+              <a:rPr lang="en-US" sz="2000" dirty="0" err="1">
+                <a:latin typeface="+mj-lt"/>
+              </a:rPr>
+              <a:t>ChemBERTa</a:t>
+            </a:r>
+            <a:endParaRPr lang="en-US" sz="2000" dirty="0">
+              <a:latin typeface="+mj-lt"/>
+            </a:endParaRPr>
+          </a:p>
+          <a:p>
+            <a:pPr>
+              <a:buFontTx/>
+              <a:buChar char="-"/>
+            </a:pPr>
+            <a:r>
+              <a:rPr lang="ru-RU" sz="2000" dirty="0">
+                <a:latin typeface="+mj-lt"/>
+              </a:rPr>
+              <a:t>учитывает контекст</a:t>
+            </a:r>
+          </a:p>
+          <a:p>
+            <a:pPr>
+              <a:buFontTx/>
+              <a:buChar char="-"/>
+            </a:pPr>
+            <a:r>
+              <a:rPr lang="ru-RU" sz="2000" dirty="0">
+                <a:latin typeface="+mj-lt"/>
+              </a:rPr>
+              <a:t>использует </a:t>
+            </a:r>
+            <a:r>
+              <a:rPr lang="en-US" sz="2000" dirty="0">
+                <a:latin typeface="+mj-lt"/>
+              </a:rPr>
+              <a:t>self-attention</a:t>
+            </a:r>
+            <a:endParaRPr lang="ru-RU" sz="2000" dirty="0">
+              <a:latin typeface="+mj-lt"/>
+            </a:endParaRPr>
+          </a:p>
+          <a:p>
+            <a:pPr>
+              <a:buFontTx/>
+              <a:buChar char="-"/>
+            </a:pPr>
+            <a:r>
+              <a:rPr lang="ru-RU" sz="2000" dirty="0">
+                <a:latin typeface="+mj-lt"/>
+              </a:rPr>
+              <a:t>лучший результат</a:t>
+            </a:r>
+          </a:p>
+        </p:txBody>
+      </p:sp>
+      <p:sp>
+        <p:nvSpPr>
+          <p:cNvPr id="6" name="TextBox 5">
+            <a:extLst>
+              <a:ext uri="{FF2B5EF4-FFF2-40B4-BE49-F238E27FC236}">
+                <a16:creationId xmlns:a16="http://schemas.microsoft.com/office/drawing/2014/main" id="{8B11F1ED-EF07-4287-9D69-1B8958B7E4B9}"/>
+              </a:ext>
+            </a:extLst>
+          </p:cNvPr>
+          <p:cNvSpPr txBox="1"/>
+          <p:nvPr/>
+        </p:nvSpPr>
+        <p:spPr>
+          <a:xfrm>
+            <a:off x="4564049" y="3429000"/>
+            <a:ext cx="3379305" cy="3170099"/>
+          </a:xfrm>
+          <a:prstGeom prst="rect">
+            <a:avLst/>
+          </a:prstGeom>
+          <a:noFill/>
+        </p:spPr>
+        <p:txBody>
+          <a:bodyPr wrap="square" rtlCol="0">
+            <a:spAutoFit/>
+          </a:bodyPr>
+          <a:lstStyle/>
+          <a:p>
+            <a:r>
+              <a:rPr lang="en-US" sz="2000" dirty="0">
+                <a:latin typeface="+mj-lt"/>
+              </a:rPr>
+              <a:t>GCN</a:t>
+            </a:r>
+          </a:p>
+          <a:p>
+            <a:pPr marL="457200" indent="-457200">
+              <a:buFontTx/>
+              <a:buChar char="-"/>
+            </a:pPr>
+            <a:r>
+              <a:rPr lang="ru-RU" sz="2000" dirty="0">
+                <a:latin typeface="+mj-lt"/>
+              </a:rPr>
+              <a:t>учитывает топологию молекулы</a:t>
+            </a:r>
+          </a:p>
+          <a:p>
+            <a:pPr marL="457200" indent="-457200">
+              <a:buFontTx/>
+              <a:buChar char="-"/>
+            </a:pPr>
+            <a:endParaRPr lang="ru-RU" sz="2000" dirty="0">
+              <a:latin typeface="+mj-lt"/>
+            </a:endParaRPr>
+          </a:p>
+          <a:p>
+            <a:pPr marL="457200" indent="-457200">
+              <a:buFontTx/>
+              <a:buChar char="-"/>
+            </a:pPr>
+            <a:r>
+              <a:rPr lang="ru-RU" sz="2000" dirty="0">
+                <a:latin typeface="+mj-lt"/>
+              </a:rPr>
+              <a:t>хуже видит глобальные зависимости</a:t>
+            </a:r>
+          </a:p>
+          <a:p>
+            <a:pPr marL="457200" indent="-457200">
+              <a:buFontTx/>
+              <a:buChar char="-"/>
+            </a:pPr>
+            <a:endParaRPr lang="ru-RU" sz="2000" dirty="0">
+              <a:latin typeface="+mj-lt"/>
+            </a:endParaRPr>
+          </a:p>
+          <a:p>
+            <a:pPr marL="457200" indent="-457200">
+              <a:buFontTx/>
+              <a:buChar char="-"/>
+            </a:pPr>
+            <a:r>
+              <a:rPr lang="ru-RU" sz="2000" dirty="0">
+                <a:latin typeface="+mj-lt"/>
+              </a:rPr>
+              <a:t>Не распознает конформационные изменения</a:t>
+            </a:r>
+          </a:p>
+        </p:txBody>
+      </p:sp>
+      <p:sp>
+        <p:nvSpPr>
+          <p:cNvPr id="7" name="TextBox 6">
+            <a:extLst>
+              <a:ext uri="{FF2B5EF4-FFF2-40B4-BE49-F238E27FC236}">
+                <a16:creationId xmlns:a16="http://schemas.microsoft.com/office/drawing/2014/main" id="{49666B2F-9D03-456A-93A7-A1F9BA919100}"/>
+              </a:ext>
+            </a:extLst>
+          </p:cNvPr>
+          <p:cNvSpPr txBox="1"/>
+          <p:nvPr/>
+        </p:nvSpPr>
+        <p:spPr>
+          <a:xfrm>
+            <a:off x="8473441" y="3429000"/>
+            <a:ext cx="3609230" cy="2862322"/>
+          </a:xfrm>
+          <a:prstGeom prst="rect">
+            <a:avLst/>
+          </a:prstGeom>
+          <a:noFill/>
+        </p:spPr>
+        <p:txBody>
+          <a:bodyPr wrap="square" rtlCol="0">
+            <a:spAutoFit/>
+          </a:bodyPr>
+          <a:lstStyle/>
+          <a:p>
+            <a:r>
+              <a:rPr lang="en-US" sz="2000" dirty="0">
+                <a:latin typeface="+mj-lt"/>
+              </a:rPr>
+              <a:t>Random Forest</a:t>
+            </a:r>
+          </a:p>
+          <a:p>
+            <a:pPr marL="342900" indent="-342900">
+              <a:buFontTx/>
+              <a:buChar char="-"/>
+            </a:pPr>
+            <a:r>
+              <a:rPr lang="ru-RU" sz="2000" dirty="0">
+                <a:latin typeface="+mj-lt"/>
+              </a:rPr>
+              <a:t>аппроксимирует зависимости</a:t>
+            </a:r>
+          </a:p>
+          <a:p>
+            <a:pPr marL="342900" indent="-342900">
+              <a:buFontTx/>
+              <a:buChar char="-"/>
+            </a:pPr>
+            <a:endParaRPr lang="ru-RU" sz="2000" dirty="0">
+              <a:latin typeface="+mj-lt"/>
+            </a:endParaRPr>
+          </a:p>
+          <a:p>
+            <a:pPr marL="342900" indent="-342900">
+              <a:buFontTx/>
+              <a:buChar char="-"/>
+            </a:pPr>
+            <a:r>
+              <a:rPr lang="ru-RU" sz="2000" dirty="0">
+                <a:latin typeface="+mj-lt"/>
+              </a:rPr>
+              <a:t>вообще не учитывает контекст молекулы</a:t>
+            </a:r>
+          </a:p>
+          <a:p>
+            <a:pPr marL="342900" indent="-342900">
+              <a:buFontTx/>
+              <a:buChar char="-"/>
+            </a:pPr>
+            <a:endParaRPr lang="ru-RU" sz="2000" dirty="0">
+              <a:latin typeface="+mj-lt"/>
+            </a:endParaRPr>
+          </a:p>
+          <a:p>
+            <a:pPr marL="342900" indent="-342900">
+              <a:buFontTx/>
+              <a:buChar char="-"/>
+            </a:pPr>
+            <a:r>
+              <a:rPr lang="ru-RU" sz="2000" dirty="0">
+                <a:latin typeface="+mj-lt"/>
+              </a:rPr>
+              <a:t>минимальная вычислительная сложность</a:t>
+            </a:r>
+          </a:p>
+        </p:txBody>
+      </p:sp>
     </p:spTree>
     <p:extLst>
       <p:ext uri="{BB962C8B-B14F-4D97-AF65-F5344CB8AC3E}">
@@ -3986,334 +4467,6 @@
 </file>
 
 <file path=ppt/slides/slide11.xml><?xml version="1.0" encoding="utf-8"?>
-<p:sld xmlns:a="http://schemas.openxmlformats.org/drawingml/2006/main" xmlns:r="http://schemas.openxmlformats.org/officeDocument/2006/relationships" xmlns:p="http://schemas.openxmlformats.org/presentationml/2006/main">
-  <p:cSld>
-    <p:spTree>
-      <p:nvGrpSpPr>
-        <p:cNvPr id="1" name=""/>
-        <p:cNvGrpSpPr/>
-        <p:nvPr/>
-      </p:nvGrpSpPr>
-      <p:grpSpPr>
-        <a:xfrm>
-          <a:off x="0" y="0"/>
-          <a:ext cx="0" cy="0"/>
-          <a:chOff x="0" y="0"/>
-          <a:chExt cx="0" cy="0"/>
-        </a:xfrm>
-      </p:grpSpPr>
-      <p:sp>
-        <p:nvSpPr>
-          <p:cNvPr id="2" name="Заголовок 1">
-            <a:extLst>
-              <a:ext uri="{FF2B5EF4-FFF2-40B4-BE49-F238E27FC236}">
-                <a16:creationId xmlns:a16="http://schemas.microsoft.com/office/drawing/2014/main" id="{D64B6B42-E5D8-436F-9680-F4F6141B553D}"/>
-              </a:ext>
-            </a:extLst>
-          </p:cNvPr>
-          <p:cNvSpPr>
-            <a:spLocks noGrp="1"/>
-          </p:cNvSpPr>
-          <p:nvPr>
-            <p:ph type="title"/>
-          </p:nvPr>
-        </p:nvSpPr>
-        <p:spPr/>
-        <p:txBody>
-          <a:bodyPr/>
-          <a:lstStyle/>
-          <a:p>
-            <a:r>
-              <a:rPr lang="ru-RU" dirty="0"/>
-              <a:t>Итоги</a:t>
-            </a:r>
-          </a:p>
-        </p:txBody>
-      </p:sp>
-      <p:sp>
-        <p:nvSpPr>
-          <p:cNvPr id="3" name="Объект 2">
-            <a:extLst>
-              <a:ext uri="{FF2B5EF4-FFF2-40B4-BE49-F238E27FC236}">
-                <a16:creationId xmlns:a16="http://schemas.microsoft.com/office/drawing/2014/main" id="{1453E53B-3B82-43EC-BC5B-EE030C01FEEF}"/>
-              </a:ext>
-            </a:extLst>
-          </p:cNvPr>
-          <p:cNvSpPr>
-            <a:spLocks noGrp="1"/>
-          </p:cNvSpPr>
-          <p:nvPr>
-            <p:ph idx="1"/>
-          </p:nvPr>
-        </p:nvSpPr>
-        <p:spPr>
-          <a:xfrm>
-            <a:off x="146436" y="1762015"/>
-            <a:ext cx="4139317" cy="4351338"/>
-          </a:xfrm>
-        </p:spPr>
-        <p:txBody>
-          <a:bodyPr>
-            <a:normAutofit/>
-          </a:bodyPr>
-          <a:lstStyle/>
-          <a:p>
-            <a:pPr marL="0" indent="0">
-              <a:buNone/>
-            </a:pPr>
-            <a:r>
-              <a:rPr lang="en-US" sz="2000" dirty="0" err="1">
-                <a:latin typeface="+mj-lt"/>
-              </a:rPr>
-              <a:t>ChemBERTa</a:t>
-            </a:r>
-            <a:endParaRPr lang="en-US" sz="2000" dirty="0">
-              <a:latin typeface="+mj-lt"/>
-            </a:endParaRPr>
-          </a:p>
-          <a:p>
-            <a:pPr>
-              <a:buFontTx/>
-              <a:buChar char="-"/>
-            </a:pPr>
-            <a:r>
-              <a:rPr lang="ru-RU" sz="2000" dirty="0">
-                <a:latin typeface="+mj-lt"/>
-              </a:rPr>
-              <a:t>учитывает контекст</a:t>
-            </a:r>
-          </a:p>
-          <a:p>
-            <a:pPr>
-              <a:buFontTx/>
-              <a:buChar char="-"/>
-            </a:pPr>
-            <a:r>
-              <a:rPr lang="ru-RU" sz="2000" dirty="0">
-                <a:latin typeface="+mj-lt"/>
-              </a:rPr>
-              <a:t>использует </a:t>
-            </a:r>
-            <a:r>
-              <a:rPr lang="en-US" sz="2000" dirty="0">
-                <a:latin typeface="+mj-lt"/>
-              </a:rPr>
-              <a:t>self-attention</a:t>
-            </a:r>
-            <a:endParaRPr lang="ru-RU" sz="2000" dirty="0">
-              <a:latin typeface="+mj-lt"/>
-            </a:endParaRPr>
-          </a:p>
-          <a:p>
-            <a:pPr>
-              <a:buFontTx/>
-              <a:buChar char="-"/>
-            </a:pPr>
-            <a:r>
-              <a:rPr lang="ru-RU" sz="2000" dirty="0">
-                <a:latin typeface="+mj-lt"/>
-              </a:rPr>
-              <a:t>лучший результат</a:t>
-            </a:r>
-          </a:p>
-        </p:txBody>
-      </p:sp>
-      <p:sp>
-        <p:nvSpPr>
-          <p:cNvPr id="4" name="TextBox 3">
-            <a:extLst>
-              <a:ext uri="{FF2B5EF4-FFF2-40B4-BE49-F238E27FC236}">
-                <a16:creationId xmlns:a16="http://schemas.microsoft.com/office/drawing/2014/main" id="{E9835A6E-2FB3-4FB0-8D05-34CA13F94598}"/>
-              </a:ext>
-            </a:extLst>
-          </p:cNvPr>
-          <p:cNvSpPr txBox="1"/>
-          <p:nvPr/>
-        </p:nvSpPr>
-        <p:spPr>
-          <a:xfrm>
-            <a:off x="4055165" y="1690688"/>
-            <a:ext cx="3379305" cy="3170099"/>
-          </a:xfrm>
-          <a:prstGeom prst="rect">
-            <a:avLst/>
-          </a:prstGeom>
-          <a:noFill/>
-        </p:spPr>
-        <p:txBody>
-          <a:bodyPr wrap="square" rtlCol="0">
-            <a:spAutoFit/>
-          </a:bodyPr>
-          <a:lstStyle/>
-          <a:p>
-            <a:r>
-              <a:rPr lang="en-US" sz="2000" dirty="0">
-                <a:latin typeface="+mj-lt"/>
-              </a:rPr>
-              <a:t>GCN</a:t>
-            </a:r>
-          </a:p>
-          <a:p>
-            <a:pPr marL="457200" indent="-457200">
-              <a:buFontTx/>
-              <a:buChar char="-"/>
-            </a:pPr>
-            <a:r>
-              <a:rPr lang="ru-RU" sz="2000" dirty="0">
-                <a:latin typeface="+mj-lt"/>
-              </a:rPr>
-              <a:t>учитывает топологию молекулы</a:t>
-            </a:r>
-          </a:p>
-          <a:p>
-            <a:pPr marL="457200" indent="-457200">
-              <a:buFontTx/>
-              <a:buChar char="-"/>
-            </a:pPr>
-            <a:endParaRPr lang="ru-RU" sz="2000" dirty="0">
-              <a:latin typeface="+mj-lt"/>
-            </a:endParaRPr>
-          </a:p>
-          <a:p>
-            <a:pPr marL="457200" indent="-457200">
-              <a:buFontTx/>
-              <a:buChar char="-"/>
-            </a:pPr>
-            <a:r>
-              <a:rPr lang="ru-RU" sz="2000" dirty="0">
-                <a:latin typeface="+mj-lt"/>
-              </a:rPr>
-              <a:t>хуже видит глобальные зависимости</a:t>
-            </a:r>
-          </a:p>
-          <a:p>
-            <a:pPr marL="457200" indent="-457200">
-              <a:buFontTx/>
-              <a:buChar char="-"/>
-            </a:pPr>
-            <a:endParaRPr lang="ru-RU" sz="2000" dirty="0">
-              <a:latin typeface="+mj-lt"/>
-            </a:endParaRPr>
-          </a:p>
-          <a:p>
-            <a:pPr marL="457200" indent="-457200">
-              <a:buFontTx/>
-              <a:buChar char="-"/>
-            </a:pPr>
-            <a:r>
-              <a:rPr lang="ru-RU" sz="2000" dirty="0">
-                <a:latin typeface="+mj-lt"/>
-              </a:rPr>
-              <a:t>Не распознает конформационные изменения</a:t>
-            </a:r>
-          </a:p>
-        </p:txBody>
-      </p:sp>
-      <p:sp>
-        <p:nvSpPr>
-          <p:cNvPr id="5" name="TextBox 4">
-            <a:extLst>
-              <a:ext uri="{FF2B5EF4-FFF2-40B4-BE49-F238E27FC236}">
-                <a16:creationId xmlns:a16="http://schemas.microsoft.com/office/drawing/2014/main" id="{0CA41B4E-4099-4032-B8A3-EE02CDE7E4A7}"/>
-              </a:ext>
-            </a:extLst>
-          </p:cNvPr>
-          <p:cNvSpPr txBox="1"/>
-          <p:nvPr/>
-        </p:nvSpPr>
-        <p:spPr>
-          <a:xfrm>
-            <a:off x="8643068" y="1690688"/>
-            <a:ext cx="3609230" cy="2862322"/>
-          </a:xfrm>
-          <a:prstGeom prst="rect">
-            <a:avLst/>
-          </a:prstGeom>
-          <a:noFill/>
-        </p:spPr>
-        <p:txBody>
-          <a:bodyPr wrap="square" rtlCol="0">
-            <a:spAutoFit/>
-          </a:bodyPr>
-          <a:lstStyle/>
-          <a:p>
-            <a:r>
-              <a:rPr lang="en-US" sz="2000" dirty="0">
-                <a:latin typeface="+mj-lt"/>
-              </a:rPr>
-              <a:t>Random Forest</a:t>
-            </a:r>
-          </a:p>
-          <a:p>
-            <a:pPr marL="342900" indent="-342900">
-              <a:buFontTx/>
-              <a:buChar char="-"/>
-            </a:pPr>
-            <a:r>
-              <a:rPr lang="ru-RU" sz="2000" dirty="0">
-                <a:latin typeface="+mj-lt"/>
-              </a:rPr>
-              <a:t>аппроксимирует зависимости</a:t>
-            </a:r>
-          </a:p>
-          <a:p>
-            <a:pPr marL="342900" indent="-342900">
-              <a:buFontTx/>
-              <a:buChar char="-"/>
-            </a:pPr>
-            <a:endParaRPr lang="ru-RU" sz="2000" dirty="0">
-              <a:latin typeface="+mj-lt"/>
-            </a:endParaRPr>
-          </a:p>
-          <a:p>
-            <a:pPr marL="342900" indent="-342900">
-              <a:buFontTx/>
-              <a:buChar char="-"/>
-            </a:pPr>
-            <a:r>
-              <a:rPr lang="ru-RU" sz="2000" dirty="0">
-                <a:latin typeface="+mj-lt"/>
-              </a:rPr>
-              <a:t>вообще не учитывает контекст молекулы</a:t>
-            </a:r>
-          </a:p>
-          <a:p>
-            <a:pPr marL="342900" indent="-342900">
-              <a:buFontTx/>
-              <a:buChar char="-"/>
-            </a:pPr>
-            <a:endParaRPr lang="ru-RU" sz="2000" dirty="0">
-              <a:latin typeface="+mj-lt"/>
-            </a:endParaRPr>
-          </a:p>
-          <a:p>
-            <a:pPr marL="342900" indent="-342900">
-              <a:buFontTx/>
-              <a:buChar char="-"/>
-            </a:pPr>
-            <a:r>
-              <a:rPr lang="ru-RU" sz="2000" dirty="0">
-                <a:latin typeface="+mj-lt"/>
-              </a:rPr>
-              <a:t>минимальная вычислительная сложность</a:t>
-            </a:r>
-          </a:p>
-        </p:txBody>
-      </p:sp>
-    </p:spTree>
-    <p:extLst>
-      <p:ext uri="{BB962C8B-B14F-4D97-AF65-F5344CB8AC3E}">
-        <p14:creationId xmlns:p14="http://schemas.microsoft.com/office/powerpoint/2010/main" val="4069270628"/>
-      </p:ext>
-    </p:extLst>
-  </p:cSld>
-  <p:clrMapOvr>
-    <a:masterClrMapping/>
-  </p:clrMapOvr>
-</p:sld>
-</file>
-
-<file path=ppt/slides/slide12.xml><?xml version="1.0" encoding="utf-8"?>
 <p:sld xmlns:a="http://schemas.openxmlformats.org/drawingml/2006/main" xmlns:r="http://schemas.openxmlformats.org/officeDocument/2006/relationships" xmlns:p="http://schemas.openxmlformats.org/presentationml/2006/main">
   <p:cSld>
     <p:spTree>
@@ -4444,7 +4597,7 @@
 </p:sld>
 </file>
 
-<file path=ppt/slides/slide13.xml><?xml version="1.0" encoding="utf-8"?>
+<file path=ppt/slides/slide12.xml><?xml version="1.0" encoding="utf-8"?>
 <p:sld xmlns:a="http://schemas.openxmlformats.org/drawingml/2006/main" xmlns:r="http://schemas.openxmlformats.org/officeDocument/2006/relationships" xmlns:p="http://schemas.openxmlformats.org/presentationml/2006/main">
   <p:cSld>
     <p:spTree>
@@ -5400,8 +5553,8 @@
           </a:p>
         </p:txBody>
       </p:sp>
-      <mc:AlternateContent xmlns:mc="http://schemas.openxmlformats.org/markup-compatibility/2006">
-        <mc:Choice xmlns:a14="http://schemas.microsoft.com/office/drawing/2010/main" Requires="a14">
+      <mc:AlternateContent xmlns:mc="http://schemas.openxmlformats.org/markup-compatibility/2006" xmlns:a14="http://schemas.microsoft.com/office/drawing/2010/main">
+        <mc:Choice Requires="a14">
           <p:sp>
             <p:nvSpPr>
               <p:cNvPr id="3" name="Объект 2">
@@ -5693,7 +5846,7 @@
             </p:txBody>
           </p:sp>
         </mc:Choice>
-        <mc:Fallback>
+        <mc:Fallback xmlns="">
           <p:sp>
             <p:nvSpPr>
               <p:cNvPr id="3" name="Объект 2">
@@ -5940,8 +6093,8 @@
           </a:p>
         </p:txBody>
       </p:sp>
-      <mc:AlternateContent xmlns:mc="http://schemas.openxmlformats.org/markup-compatibility/2006">
-        <mc:Choice xmlns:a14="http://schemas.microsoft.com/office/drawing/2010/main" Requires="a14">
+      <mc:AlternateContent xmlns:mc="http://schemas.openxmlformats.org/markup-compatibility/2006" xmlns:a14="http://schemas.microsoft.com/office/drawing/2010/main">
+        <mc:Choice Requires="a14">
           <p:sp>
             <p:nvSpPr>
               <p:cNvPr id="3" name="Объект 2">
@@ -6758,7 +6911,7 @@
             </p:txBody>
           </p:sp>
         </mc:Choice>
-        <mc:Fallback>
+        <mc:Fallback xmlns="">
           <p:sp>
             <p:nvSpPr>
               <p:cNvPr id="3" name="Объект 2">

</xml_diff>